<commit_message>
added slide with activities for module 1.1
</commit_message>
<xml_diff>
--- a/Slides/Module 01.1 Course Introduction.pptx
+++ b/Slides/Module 01.1 Course Introduction.pptx
@@ -5,7 +5,7 @@
     <p:sldMasterId id="2147483648" r:id="rId1"/>
   </p:sldMasterIdLst>
   <p:notesMasterIdLst>
-    <p:notesMasterId r:id="rId24"/>
+    <p:notesMasterId r:id="rId25"/>
   </p:notesMasterIdLst>
   <p:sldIdLst>
     <p:sldId id="256" r:id="rId2"/>
@@ -30,6 +30,7 @@
     <p:sldId id="306" r:id="rId21"/>
     <p:sldId id="314" r:id="rId22"/>
     <p:sldId id="305" r:id="rId23"/>
+    <p:sldId id="355" r:id="rId24"/>
   </p:sldIdLst>
   <p:sldSz cx="12192000" cy="6858000"/>
   <p:notesSz cx="6858000" cy="9144000"/>
@@ -4282,6 +4283,98 @@
 </p:notes>
 </file>
 
+<file path=ppt/notesSlides/notesSlide6.xml><?xml version="1.0" encoding="utf-8"?>
+<p:notes xmlns:a="http://schemas.openxmlformats.org/drawingml/2006/main" xmlns:r="http://schemas.openxmlformats.org/officeDocument/2006/relationships" xmlns:p="http://schemas.openxmlformats.org/presentationml/2006/main">
+  <p:cSld>
+    <p:spTree>
+      <p:nvGrpSpPr>
+        <p:cNvPr id="1" name=""/>
+        <p:cNvGrpSpPr/>
+        <p:nvPr/>
+      </p:nvGrpSpPr>
+      <p:grpSpPr>
+        <a:xfrm>
+          <a:off x="0" y="0"/>
+          <a:ext cx="0" cy="0"/>
+          <a:chOff x="0" y="0"/>
+          <a:chExt cx="0" cy="0"/>
+        </a:xfrm>
+      </p:grpSpPr>
+      <p:sp>
+        <p:nvSpPr>
+          <p:cNvPr id="2" name="Slide Image Placeholder 1"/>
+          <p:cNvSpPr>
+            <a:spLocks noGrp="1" noRot="1" noChangeAspect="1"/>
+          </p:cNvSpPr>
+          <p:nvPr>
+            <p:ph type="sldImg"/>
+          </p:nvPr>
+        </p:nvSpPr>
+        <p:spPr/>
+      </p:sp>
+      <p:sp>
+        <p:nvSpPr>
+          <p:cNvPr id="3" name="Notes Placeholder 2"/>
+          <p:cNvSpPr>
+            <a:spLocks noGrp="1"/>
+          </p:cNvSpPr>
+          <p:nvPr>
+            <p:ph type="body" idx="1"/>
+          </p:nvPr>
+        </p:nvSpPr>
+        <p:spPr/>
+        <p:txBody>
+          <a:bodyPr/>
+          <a:lstStyle/>
+          <a:p>
+            <a:endParaRPr lang="en-US" sz="1200" b="0" i="0" u="none" strike="noStrike" kern="1200" dirty="0">
+              <a:solidFill>
+                <a:schemeClr val="tx1"/>
+              </a:solidFill>
+              <a:effectLst/>
+              <a:latin typeface="+mn-lt"/>
+              <a:ea typeface="+mn-ea"/>
+              <a:cs typeface="+mn-cs"/>
+            </a:endParaRPr>
+          </a:p>
+        </p:txBody>
+      </p:sp>
+      <p:sp>
+        <p:nvSpPr>
+          <p:cNvPr id="4" name="Slide Number Placeholder 3"/>
+          <p:cNvSpPr>
+            <a:spLocks noGrp="1"/>
+          </p:cNvSpPr>
+          <p:nvPr>
+            <p:ph type="sldNum" sz="quarter" idx="5"/>
+          </p:nvPr>
+        </p:nvSpPr>
+        <p:spPr/>
+        <p:txBody>
+          <a:bodyPr/>
+          <a:lstStyle/>
+          <a:p>
+            <a:fld id="{07937F07-1250-4CCE-B198-1B2887014F41}" type="slidenum">
+              <a:rPr lang="en-US" smtClean="0"/>
+              <a:t>23</a:t>
+            </a:fld>
+            <a:endParaRPr lang="en-US"/>
+          </a:p>
+        </p:txBody>
+      </p:sp>
+    </p:spTree>
+    <p:extLst>
+      <p:ext uri="{BB962C8B-B14F-4D97-AF65-F5344CB8AC3E}">
+        <p14:creationId xmlns:p14="http://schemas.microsoft.com/office/powerpoint/2010/main" val="3002489578"/>
+      </p:ext>
+    </p:extLst>
+  </p:cSld>
+  <p:clrMapOvr>
+    <a:masterClrMapping/>
+  </p:clrMapOvr>
+</p:notes>
+</file>
+
 <file path=ppt/slideLayouts/slideLayout1.xml><?xml version="1.0" encoding="utf-8"?>
 <p:sldLayout xmlns:a="http://schemas.openxmlformats.org/drawingml/2006/main" xmlns:r="http://schemas.openxmlformats.org/officeDocument/2006/relationships" xmlns:p="http://schemas.openxmlformats.org/presentationml/2006/main" type="title" preserve="1">
   <p:cSld name="Title Slide">
@@ -10939,6 +11032,162 @@
 </p:sld>
 </file>
 
+<file path=ppt/slides/slide23.xml><?xml version="1.0" encoding="utf-8"?>
+<p:sld xmlns:a="http://schemas.openxmlformats.org/drawingml/2006/main" xmlns:r="http://schemas.openxmlformats.org/officeDocument/2006/relationships" xmlns:p="http://schemas.openxmlformats.org/presentationml/2006/main">
+  <p:cSld>
+    <p:spTree>
+      <p:nvGrpSpPr>
+        <p:cNvPr id="1" name=""/>
+        <p:cNvGrpSpPr/>
+        <p:nvPr/>
+      </p:nvGrpSpPr>
+      <p:grpSpPr>
+        <a:xfrm>
+          <a:off x="0" y="0"/>
+          <a:ext cx="0" cy="0"/>
+          <a:chOff x="0" y="0"/>
+          <a:chExt cx="0" cy="0"/>
+        </a:xfrm>
+      </p:grpSpPr>
+      <p:sp>
+        <p:nvSpPr>
+          <p:cNvPr id="2" name="Title 1">
+            <a:extLst>
+              <a:ext uri="{FF2B5EF4-FFF2-40B4-BE49-F238E27FC236}">
+                <a16:creationId xmlns:a16="http://schemas.microsoft.com/office/drawing/2014/main" id="{4F8F7B5D-FB6C-436E-B15E-6071C1AF4E43}"/>
+              </a:ext>
+            </a:extLst>
+          </p:cNvPr>
+          <p:cNvSpPr>
+            <a:spLocks noGrp="1"/>
+          </p:cNvSpPr>
+          <p:nvPr>
+            <p:ph type="title"/>
+          </p:nvPr>
+        </p:nvSpPr>
+        <p:spPr/>
+        <p:txBody>
+          <a:bodyPr/>
+          <a:lstStyle/>
+          <a:p>
+            <a:r>
+              <a:rPr lang="en-US" dirty="0"/>
+              <a:t>Lesson 1.1 Activity: Introductions</a:t>
+            </a:r>
+          </a:p>
+        </p:txBody>
+      </p:sp>
+      <p:sp>
+        <p:nvSpPr>
+          <p:cNvPr id="3" name="Content Placeholder 2">
+            <a:extLst>
+              <a:ext uri="{FF2B5EF4-FFF2-40B4-BE49-F238E27FC236}">
+                <a16:creationId xmlns:a16="http://schemas.microsoft.com/office/drawing/2014/main" id="{A35947AF-DDC1-4EDB-B11F-00E505483FD1}"/>
+              </a:ext>
+            </a:extLst>
+          </p:cNvPr>
+          <p:cNvSpPr>
+            <a:spLocks noGrp="1"/>
+          </p:cNvSpPr>
+          <p:nvPr>
+            <p:ph idx="1"/>
+          </p:nvPr>
+        </p:nvSpPr>
+        <p:spPr>
+          <a:xfrm>
+            <a:off x="838199" y="1777999"/>
+            <a:ext cx="9812867" cy="3291712"/>
+          </a:xfrm>
+        </p:spPr>
+        <p:txBody>
+          <a:bodyPr>
+            <a:normAutofit/>
+          </a:bodyPr>
+          <a:lstStyle/>
+          <a:p>
+            <a:r>
+              <a:rPr lang="en-US" dirty="0"/>
+              <a:t>Activity 1:  Introduce yourself and ask students to introduce themselves</a:t>
+            </a:r>
+          </a:p>
+          <a:p>
+            <a:endParaRPr lang="en-US" dirty="0"/>
+          </a:p>
+          <a:p>
+            <a:r>
+              <a:rPr lang="en-US" dirty="0"/>
+              <a:t>Activity 2 {Optional}: </a:t>
+            </a:r>
+            <a:r>
+              <a:rPr lang="en-US" b="1" dirty="0"/>
+              <a:t>Welcome Survey</a:t>
+            </a:r>
+          </a:p>
+          <a:p>
+            <a:pPr lvl="1"/>
+            <a:r>
+              <a:rPr lang="en-US" dirty="0"/>
+              <a:t>Share the Survey Link with Students.</a:t>
+            </a:r>
+          </a:p>
+          <a:p>
+            <a:pPr lvl="1"/>
+            <a:r>
+              <a:rPr lang="en-US" dirty="0"/>
+              <a:t>Allow them to complete the survey</a:t>
+            </a:r>
+          </a:p>
+          <a:p>
+            <a:pPr lvl="1"/>
+            <a:r>
+              <a:rPr lang="en-US" dirty="0"/>
+              <a:t>Discuss survey responses and answer questions.</a:t>
+            </a:r>
+          </a:p>
+        </p:txBody>
+      </p:sp>
+      <p:sp>
+        <p:nvSpPr>
+          <p:cNvPr id="4" name="Slide Number Placeholder 3">
+            <a:extLst>
+              <a:ext uri="{FF2B5EF4-FFF2-40B4-BE49-F238E27FC236}">
+                <a16:creationId xmlns:a16="http://schemas.microsoft.com/office/drawing/2014/main" id="{80BD1BF0-3FF8-4C70-9176-0B4EFBC93609}"/>
+              </a:ext>
+            </a:extLst>
+          </p:cNvPr>
+          <p:cNvSpPr>
+            <a:spLocks noGrp="1"/>
+          </p:cNvSpPr>
+          <p:nvPr>
+            <p:ph type="sldNum" sz="quarter" idx="12"/>
+          </p:nvPr>
+        </p:nvSpPr>
+        <p:spPr/>
+        <p:txBody>
+          <a:bodyPr/>
+          <a:lstStyle/>
+          <a:p>
+            <a:fld id="{20F37917-FD3A-4669-9018-DA04BCDD3D75}" type="slidenum">
+              <a:rPr lang="en-US" smtClean="0"/>
+              <a:t>23</a:t>
+            </a:fld>
+            <a:endParaRPr lang="en-US"/>
+          </a:p>
+        </p:txBody>
+      </p:sp>
+    </p:spTree>
+    <p:extLst>
+      <p:ext uri="{BB962C8B-B14F-4D97-AF65-F5344CB8AC3E}">
+        <p14:creationId xmlns:p14="http://schemas.microsoft.com/office/powerpoint/2010/main" val="986787541"/>
+      </p:ext>
+    </p:extLst>
+  </p:cSld>
+  <p:clrMapOvr>
+    <a:masterClrMapping/>
+  </p:clrMapOvr>
+</p:sld>
+</file>
+
 <file path=ppt/slides/slide3.xml><?xml version="1.0" encoding="utf-8"?>
 <p:sld xmlns:a="http://schemas.openxmlformats.org/drawingml/2006/main" xmlns:r="http://schemas.openxmlformats.org/officeDocument/2006/relationships" xmlns:p="http://schemas.openxmlformats.org/presentationml/2006/main">
   <p:cSld>
@@ -12840,7 +13089,7 @@
           </a:ln>
           <a:extLst>
             <a:ext uri="{C572A759-6A51-4108-AA02-DFA0A04FC94B}">
-              <ma14:wrappingTextBoxFlag xmlns:ma14="http://schemas.microsoft.com/office/mac/drawingml/2011/main" xmlns:a14="http://schemas.microsoft.com/office/drawing/2010/main" xmlns:m="http://schemas.openxmlformats.org/officeDocument/2006/math" xmlns="" val="1"/>
+              <ma14:wrappingTextBoxFlag xmlns="" xmlns:m="http://schemas.openxmlformats.org/officeDocument/2006/math" xmlns:a14="http://schemas.microsoft.com/office/drawing/2010/main" xmlns:ma14="http://schemas.microsoft.com/office/mac/drawingml/2011/main" val="1"/>
             </a:ext>
           </a:extLst>
         </p:spPr>
@@ -12901,7 +13150,7 @@
           </a:ln>
           <a:extLst>
             <a:ext uri="{C572A759-6A51-4108-AA02-DFA0A04FC94B}">
-              <ma14:wrappingTextBoxFlag xmlns:ma14="http://schemas.microsoft.com/office/mac/drawingml/2011/main" xmlns:a14="http://schemas.microsoft.com/office/drawing/2010/main" xmlns:m="http://schemas.openxmlformats.org/officeDocument/2006/math" xmlns="" val="1"/>
+              <ma14:wrappingTextBoxFlag xmlns="" xmlns:m="http://schemas.openxmlformats.org/officeDocument/2006/math" xmlns:a14="http://schemas.microsoft.com/office/drawing/2010/main" xmlns:ma14="http://schemas.microsoft.com/office/mac/drawingml/2011/main" val="1"/>
             </a:ext>
           </a:extLst>
         </p:spPr>

</xml_diff>

<commit_message>
tweaked Module 01.1 slides to improve text
</commit_message>
<xml_diff>
--- a/Slides/Module 01.1 Course Introduction.pptx
+++ b/Slides/Module 01.1 Course Introduction.pptx
@@ -5,7 +5,7 @@
     <p:sldMasterId id="2147483648" r:id="rId1"/>
   </p:sldMasterIdLst>
   <p:notesMasterIdLst>
-    <p:notesMasterId r:id="rId25"/>
+    <p:notesMasterId r:id="rId26"/>
   </p:notesMasterIdLst>
   <p:sldIdLst>
     <p:sldId id="256" r:id="rId2"/>
@@ -23,14 +23,15 @@
     <p:sldId id="292" r:id="rId14"/>
     <p:sldId id="308" r:id="rId15"/>
     <p:sldId id="299" r:id="rId16"/>
-    <p:sldId id="318" r:id="rId17"/>
-    <p:sldId id="279" r:id="rId18"/>
-    <p:sldId id="280" r:id="rId19"/>
-    <p:sldId id="297" r:id="rId20"/>
-    <p:sldId id="306" r:id="rId21"/>
-    <p:sldId id="314" r:id="rId22"/>
-    <p:sldId id="305" r:id="rId23"/>
-    <p:sldId id="355" r:id="rId24"/>
+    <p:sldId id="356" r:id="rId17"/>
+    <p:sldId id="318" r:id="rId18"/>
+    <p:sldId id="279" r:id="rId19"/>
+    <p:sldId id="280" r:id="rId20"/>
+    <p:sldId id="297" r:id="rId21"/>
+    <p:sldId id="306" r:id="rId22"/>
+    <p:sldId id="314" r:id="rId23"/>
+    <p:sldId id="305" r:id="rId24"/>
+    <p:sldId id="355" r:id="rId25"/>
   </p:sldIdLst>
   <p:sldSz cx="12192000" cy="6858000"/>
   <p:notesSz cx="6858000" cy="9144000"/>
@@ -140,7 +141,7 @@
 <file path=ppt/revisionInfo.xml><?xml version="1.0" encoding="utf-8"?>
 <p1510:revInfo xmlns:a="http://schemas.openxmlformats.org/drawingml/2006/main" xmlns:r="http://schemas.openxmlformats.org/officeDocument/2006/relationships" xmlns:p1510="http://schemas.microsoft.com/office/powerpoint/2015/10/main">
   <p1510:revLst>
-    <p1510:client id="{84254308-5F2F-40C8-A19F-CD2A024C639D}" v="1" dt="2022-09-09T02:31:31.539"/>
+    <p1510:client id="{83AB7DCC-FB13-4DF2-B595-86DAC0B4855C}" v="2" dt="2022-12-20T01:59:49.355"/>
   </p1510:revLst>
 </p1510:revInfo>
 </file>
@@ -166,6 +167,139 @@
             <pc:docMk/>
             <pc:sldMk cId="0" sldId="280"/>
             <ac:spMk id="258" creationId="{00000000-0000-0000-0000-000000000000}"/>
+          </ac:spMkLst>
+        </pc:spChg>
+      </pc:sldChg>
+    </pc:docChg>
+  </pc:docChgLst>
+  <pc:docChgLst>
+    <pc:chgData name="Mitchell Wand" userId="de9b44c55c049659" providerId="LiveId" clId="{83AB7DCC-FB13-4DF2-B595-86DAC0B4855C}"/>
+    <pc:docChg chg="undo custSel addSld modSld sldOrd">
+      <pc:chgData name="Mitchell Wand" userId="de9b44c55c049659" providerId="LiveId" clId="{83AB7DCC-FB13-4DF2-B595-86DAC0B4855C}" dt="2022-12-20T02:08:07.234" v="742" actId="20577"/>
+      <pc:docMkLst>
+        <pc:docMk/>
+      </pc:docMkLst>
+      <pc:sldChg chg="modSp mod">
+        <pc:chgData name="Mitchell Wand" userId="de9b44c55c049659" providerId="LiveId" clId="{83AB7DCC-FB13-4DF2-B595-86DAC0B4855C}" dt="2022-12-20T01:45:16.323" v="249" actId="20577"/>
+        <pc:sldMkLst>
+          <pc:docMk/>
+          <pc:sldMk cId="3191866407" sldId="299"/>
+        </pc:sldMkLst>
+        <pc:spChg chg="mod">
+          <ac:chgData name="Mitchell Wand" userId="de9b44c55c049659" providerId="LiveId" clId="{83AB7DCC-FB13-4DF2-B595-86DAC0B4855C}" dt="2022-12-20T01:45:16.323" v="249" actId="20577"/>
+          <ac:spMkLst>
+            <pc:docMk/>
+            <pc:sldMk cId="3191866407" sldId="299"/>
+            <ac:spMk id="3" creationId="{3B13C7A6-A28D-4387-9F64-48979188D9B1}"/>
+          </ac:spMkLst>
+        </pc:spChg>
+      </pc:sldChg>
+      <pc:sldChg chg="modSp mod">
+        <pc:chgData name="Mitchell Wand" userId="de9b44c55c049659" providerId="LiveId" clId="{83AB7DCC-FB13-4DF2-B595-86DAC0B4855C}" dt="2022-12-20T01:43:50.237" v="168" actId="20577"/>
+        <pc:sldMkLst>
+          <pc:docMk/>
+          <pc:sldMk cId="504651817" sldId="308"/>
+        </pc:sldMkLst>
+        <pc:spChg chg="mod">
+          <ac:chgData name="Mitchell Wand" userId="de9b44c55c049659" providerId="LiveId" clId="{83AB7DCC-FB13-4DF2-B595-86DAC0B4855C}" dt="2022-12-20T01:43:50.237" v="168" actId="20577"/>
+          <ac:spMkLst>
+            <pc:docMk/>
+            <pc:sldMk cId="504651817" sldId="308"/>
+            <ac:spMk id="3" creationId="{83E7DD52-8BF4-47F1-A03F-8790E75F276E}"/>
+          </ac:spMkLst>
+        </pc:spChg>
+      </pc:sldChg>
+      <pc:sldChg chg="addSp delSp modSp mod modNotesTx">
+        <pc:chgData name="Mitchell Wand" userId="de9b44c55c049659" providerId="LiveId" clId="{83AB7DCC-FB13-4DF2-B595-86DAC0B4855C}" dt="2022-12-20T02:02:54.930" v="624" actId="6549"/>
+        <pc:sldMkLst>
+          <pc:docMk/>
+          <pc:sldMk cId="2527724101" sldId="318"/>
+        </pc:sldMkLst>
+        <pc:spChg chg="mod">
+          <ac:chgData name="Mitchell Wand" userId="de9b44c55c049659" providerId="LiveId" clId="{83AB7DCC-FB13-4DF2-B595-86DAC0B4855C}" dt="2022-12-20T01:52:25.259" v="444" actId="20577"/>
+          <ac:spMkLst>
+            <pc:docMk/>
+            <pc:sldMk cId="2527724101" sldId="318"/>
+            <ac:spMk id="2" creationId="{46CF8AAD-C000-4577-AEBC-F85F657FFE8C}"/>
+          </ac:spMkLst>
+        </pc:spChg>
+        <pc:spChg chg="mod">
+          <ac:chgData name="Mitchell Wand" userId="de9b44c55c049659" providerId="LiveId" clId="{83AB7DCC-FB13-4DF2-B595-86DAC0B4855C}" dt="2022-12-20T02:02:49.496" v="623" actId="20577"/>
+          <ac:spMkLst>
+            <pc:docMk/>
+            <pc:sldMk cId="2527724101" sldId="318"/>
+            <ac:spMk id="3" creationId="{3B13C7A6-A28D-4387-9F64-48979188D9B1}"/>
+          </ac:spMkLst>
+        </pc:spChg>
+        <pc:spChg chg="mod">
+          <ac:chgData name="Mitchell Wand" userId="de9b44c55c049659" providerId="LiveId" clId="{83AB7DCC-FB13-4DF2-B595-86DAC0B4855C}" dt="2022-12-20T02:02:27.126" v="619" actId="27636"/>
+          <ac:spMkLst>
+            <pc:docMk/>
+            <pc:sldMk cId="2527724101" sldId="318"/>
+            <ac:spMk id="5" creationId="{9E3EB6B5-1CBD-EBF7-9E2B-FDF2FC9DBE96}"/>
+          </ac:spMkLst>
+        </pc:spChg>
+        <pc:graphicFrameChg chg="add del mod modGraphic">
+          <ac:chgData name="Mitchell Wand" userId="de9b44c55c049659" providerId="LiveId" clId="{83AB7DCC-FB13-4DF2-B595-86DAC0B4855C}" dt="2022-12-20T01:57:30.027" v="537" actId="478"/>
+          <ac:graphicFrameMkLst>
+            <pc:docMk/>
+            <pc:sldMk cId="2527724101" sldId="318"/>
+            <ac:graphicFrameMk id="6" creationId="{80CD6EBD-EBD3-0E0A-768B-D348253B961A}"/>
+          </ac:graphicFrameMkLst>
+        </pc:graphicFrameChg>
+        <pc:graphicFrameChg chg="add del mod modGraphic">
+          <ac:chgData name="Mitchell Wand" userId="de9b44c55c049659" providerId="LiveId" clId="{83AB7DCC-FB13-4DF2-B595-86DAC0B4855C}" dt="2022-12-20T01:59:27.763" v="545" actId="21"/>
+          <ac:graphicFrameMkLst>
+            <pc:docMk/>
+            <pc:sldMk cId="2527724101" sldId="318"/>
+            <ac:graphicFrameMk id="8" creationId="{681FF368-9BD4-9D79-C538-7CBE52C3A340}"/>
+          </ac:graphicFrameMkLst>
+        </pc:graphicFrameChg>
+        <pc:graphicFrameChg chg="add del mod modGraphic">
+          <ac:chgData name="Mitchell Wand" userId="de9b44c55c049659" providerId="LiveId" clId="{83AB7DCC-FB13-4DF2-B595-86DAC0B4855C}" dt="2022-12-20T02:01:00.522" v="550" actId="478"/>
+          <ac:graphicFrameMkLst>
+            <pc:docMk/>
+            <pc:sldMk cId="2527724101" sldId="318"/>
+            <ac:graphicFrameMk id="9" creationId="{CF8161B6-9C14-D72F-636F-843774107A7D}"/>
+          </ac:graphicFrameMkLst>
+        </pc:graphicFrameChg>
+        <pc:picChg chg="del">
+          <ac:chgData name="Mitchell Wand" userId="de9b44c55c049659" providerId="LiveId" clId="{83AB7DCC-FB13-4DF2-B595-86DAC0B4855C}" dt="2022-12-20T01:53:19.448" v="485" actId="478"/>
+          <ac:picMkLst>
+            <pc:docMk/>
+            <pc:sldMk cId="2527724101" sldId="318"/>
+            <ac:picMk id="4" creationId="{CD25A98C-6460-DA1F-D73B-2EC23F2B0812}"/>
+          </ac:picMkLst>
+        </pc:picChg>
+      </pc:sldChg>
+      <pc:sldChg chg="modSp add mod ord">
+        <pc:chgData name="Mitchell Wand" userId="de9b44c55c049659" providerId="LiveId" clId="{83AB7DCC-FB13-4DF2-B595-86DAC0B4855C}" dt="2022-12-20T02:08:07.234" v="742" actId="20577"/>
+        <pc:sldMkLst>
+          <pc:docMk/>
+          <pc:sldMk cId="3217851107" sldId="356"/>
+        </pc:sldMkLst>
+        <pc:spChg chg="mod">
+          <ac:chgData name="Mitchell Wand" userId="de9b44c55c049659" providerId="LiveId" clId="{83AB7DCC-FB13-4DF2-B595-86DAC0B4855C}" dt="2022-12-20T02:08:07.234" v="742" actId="20577"/>
+          <ac:spMkLst>
+            <pc:docMk/>
+            <pc:sldMk cId="3217851107" sldId="356"/>
+            <ac:spMk id="2" creationId="{46CF8AAD-C000-4577-AEBC-F85F657FFE8C}"/>
+          </ac:spMkLst>
+        </pc:spChg>
+        <pc:spChg chg="mod">
+          <ac:chgData name="Mitchell Wand" userId="de9b44c55c049659" providerId="LiveId" clId="{83AB7DCC-FB13-4DF2-B595-86DAC0B4855C}" dt="2022-12-20T02:06:43.656" v="629" actId="20577"/>
+          <ac:spMkLst>
+            <pc:docMk/>
+            <pc:sldMk cId="3217851107" sldId="356"/>
+            <ac:spMk id="3" creationId="{3B13C7A6-A28D-4387-9F64-48979188D9B1}"/>
+          </ac:spMkLst>
+        </pc:spChg>
+        <pc:spChg chg="mod">
+          <ac:chgData name="Mitchell Wand" userId="de9b44c55c049659" providerId="LiveId" clId="{83AB7DCC-FB13-4DF2-B595-86DAC0B4855C}" dt="2022-12-20T01:49:15.178" v="321" actId="5793"/>
+          <ac:spMkLst>
+            <pc:docMk/>
+            <pc:sldMk cId="3217851107" sldId="356"/>
+            <ac:spMk id="5" creationId="{9E3EB6B5-1CBD-EBF7-9E2B-FDF2FC9DBE96}"/>
           </ac:spMkLst>
         </pc:spChg>
       </pc:sldChg>
@@ -3533,7 +3667,7 @@
           <a:p>
             <a:fld id="{7C7E5181-6CF5-45F7-A87A-E0E0B1FD7549}" type="datetimeFigureOut">
               <a:rPr lang="en-US" smtClean="0"/>
-              <a:t>12/17/2022</a:t>
+              <a:t>12/19/2022</a:t>
             </a:fld>
             <a:endParaRPr lang="en-US"/>
           </a:p>
@@ -4207,7 +4341,7 @@
     </p:spTree>
     <p:extLst>
       <p:ext uri="{BB962C8B-B14F-4D97-AF65-F5344CB8AC3E}">
-        <p14:creationId xmlns:p14="http://schemas.microsoft.com/office/powerpoint/2010/main" val="1260796881"/>
+        <p14:creationId xmlns:p14="http://schemas.microsoft.com/office/powerpoint/2010/main" val="875248814"/>
       </p:ext>
     </p:extLst>
   </p:cSld>
@@ -4244,12 +4378,7 @@
             <p:ph type="sldImg"/>
           </p:nvPr>
         </p:nvSpPr>
-        <p:spPr>
-          <a:xfrm>
-            <a:off x="325438" y="698500"/>
-            <a:ext cx="6207125" cy="3492500"/>
-          </a:xfrm>
-        </p:spPr>
+        <p:spPr/>
       </p:sp>
       <p:sp>
         <p:nvSpPr>
@@ -4267,13 +4396,36 @@
           <a:lstStyle/>
           <a:p>
             <a:endParaRPr lang="en-US" dirty="0"/>
+          </a:p>
+        </p:txBody>
+      </p:sp>
+      <p:sp>
+        <p:nvSpPr>
+          <p:cNvPr id="4" name="Slide Number Placeholder 3"/>
+          <p:cNvSpPr>
+            <a:spLocks noGrp="1"/>
+          </p:cNvSpPr>
+          <p:nvPr>
+            <p:ph type="sldNum" sz="quarter" idx="5"/>
+          </p:nvPr>
+        </p:nvSpPr>
+        <p:spPr/>
+        <p:txBody>
+          <a:bodyPr/>
+          <a:lstStyle/>
+          <a:p>
+            <a:fld id="{07937F07-1250-4CCE-B198-1B2887014F41}" type="slidenum">
+              <a:rPr lang="en-US" smtClean="0"/>
+              <a:t>17</a:t>
+            </a:fld>
+            <a:endParaRPr lang="en-US"/>
           </a:p>
         </p:txBody>
       </p:sp>
     </p:spTree>
     <p:extLst>
       <p:ext uri="{BB962C8B-B14F-4D97-AF65-F5344CB8AC3E}">
-        <p14:creationId xmlns:p14="http://schemas.microsoft.com/office/powerpoint/2010/main" val="2658141216"/>
+        <p14:creationId xmlns:p14="http://schemas.microsoft.com/office/powerpoint/2010/main" val="1260796881"/>
       </p:ext>
     </p:extLst>
   </p:cSld>
@@ -4310,6 +4462,72 @@
             <p:ph type="sldImg"/>
           </p:nvPr>
         </p:nvSpPr>
+        <p:spPr>
+          <a:xfrm>
+            <a:off x="325438" y="698500"/>
+            <a:ext cx="6207125" cy="3492500"/>
+          </a:xfrm>
+        </p:spPr>
+      </p:sp>
+      <p:sp>
+        <p:nvSpPr>
+          <p:cNvPr id="3" name="Notes Placeholder 2"/>
+          <p:cNvSpPr>
+            <a:spLocks noGrp="1"/>
+          </p:cNvSpPr>
+          <p:nvPr>
+            <p:ph type="body" idx="1"/>
+          </p:nvPr>
+        </p:nvSpPr>
+        <p:spPr/>
+        <p:txBody>
+          <a:bodyPr/>
+          <a:lstStyle/>
+          <a:p>
+            <a:endParaRPr lang="en-US" dirty="0"/>
+          </a:p>
+        </p:txBody>
+      </p:sp>
+    </p:spTree>
+    <p:extLst>
+      <p:ext uri="{BB962C8B-B14F-4D97-AF65-F5344CB8AC3E}">
+        <p14:creationId xmlns:p14="http://schemas.microsoft.com/office/powerpoint/2010/main" val="2658141216"/>
+      </p:ext>
+    </p:extLst>
+  </p:cSld>
+  <p:clrMapOvr>
+    <a:masterClrMapping/>
+  </p:clrMapOvr>
+</p:notes>
+</file>
+
+<file path=ppt/notesSlides/notesSlide7.xml><?xml version="1.0" encoding="utf-8"?>
+<p:notes xmlns:a="http://schemas.openxmlformats.org/drawingml/2006/main" xmlns:r="http://schemas.openxmlformats.org/officeDocument/2006/relationships" xmlns:p="http://schemas.openxmlformats.org/presentationml/2006/main">
+  <p:cSld>
+    <p:spTree>
+      <p:nvGrpSpPr>
+        <p:cNvPr id="1" name=""/>
+        <p:cNvGrpSpPr/>
+        <p:nvPr/>
+      </p:nvGrpSpPr>
+      <p:grpSpPr>
+        <a:xfrm>
+          <a:off x="0" y="0"/>
+          <a:ext cx="0" cy="0"/>
+          <a:chOff x="0" y="0"/>
+          <a:chExt cx="0" cy="0"/>
+        </a:xfrm>
+      </p:grpSpPr>
+      <p:sp>
+        <p:nvSpPr>
+          <p:cNvPr id="2" name="Slide Image Placeholder 1"/>
+          <p:cNvSpPr>
+            <a:spLocks noGrp="1" noRot="1" noChangeAspect="1"/>
+          </p:cNvSpPr>
+          <p:nvPr>
+            <p:ph type="sldImg"/>
+          </p:nvPr>
+        </p:nvSpPr>
         <p:spPr/>
       </p:sp>
       <p:sp>
@@ -4356,7 +4574,7 @@
           <a:p>
             <a:fld id="{07937F07-1250-4CCE-B198-1B2887014F41}" type="slidenum">
               <a:rPr lang="en-US" smtClean="0"/>
-              <a:t>23</a:t>
+              <a:t>24</a:t>
             </a:fld>
             <a:endParaRPr lang="en-US"/>
           </a:p>
@@ -4529,7 +4747,7 @@
           <a:p>
             <a:fld id="{5D2A64DE-480B-420F-9649-4F8E696E08E0}" type="datetime1">
               <a:rPr lang="en-US" smtClean="0"/>
-              <a:t>12/17/2022</a:t>
+              <a:t>12/19/2022</a:t>
             </a:fld>
             <a:endParaRPr lang="en-US"/>
           </a:p>
@@ -4763,7 +4981,7 @@
           <a:p>
             <a:fld id="{0D3616D0-8311-4107-9726-6B805E7D05BA}" type="datetime1">
               <a:rPr lang="en-US" smtClean="0"/>
-              <a:t>12/17/2022</a:t>
+              <a:t>12/19/2022</a:t>
             </a:fld>
             <a:endParaRPr lang="en-US"/>
           </a:p>
@@ -4971,7 +5189,7 @@
           <a:p>
             <a:fld id="{3BC2557A-5C88-417A-A763-5AC779462A5F}" type="datetime1">
               <a:rPr lang="en-US" smtClean="0"/>
-              <a:t>12/17/2022</a:t>
+              <a:t>12/19/2022</a:t>
             </a:fld>
             <a:endParaRPr lang="en-US"/>
           </a:p>
@@ -5495,7 +5713,7 @@
           <a:p>
             <a:fld id="{07C7BFD4-467E-4EDE-93EA-052F5B39A4E5}" type="datetime1">
               <a:rPr lang="en-US" smtClean="0"/>
-              <a:t>12/17/2022</a:t>
+              <a:t>12/19/2022</a:t>
             </a:fld>
             <a:endParaRPr lang="en-US"/>
           </a:p>
@@ -5808,7 +6026,7 @@
           <a:p>
             <a:fld id="{A533CBE2-D5BE-47AC-ADC2-9CDFC1D0CF90}" type="datetime1">
               <a:rPr lang="en-US" smtClean="0"/>
-              <a:t>12/17/2022</a:t>
+              <a:t>12/19/2022</a:t>
             </a:fld>
             <a:endParaRPr lang="en-US"/>
           </a:p>
@@ -6109,7 +6327,7 @@
           <a:p>
             <a:fld id="{39B7EDB1-CE74-4951-85A2-0B01C2128E28}" type="datetime1">
               <a:rPr lang="en-US" smtClean="0"/>
-              <a:t>12/17/2022</a:t>
+              <a:t>12/19/2022</a:t>
             </a:fld>
             <a:endParaRPr lang="en-US"/>
           </a:p>
@@ -6557,7 +6775,7 @@
           <a:p>
             <a:fld id="{2BC7EB92-A5C2-4807-A9DC-9EDE6CBFB241}" type="datetime1">
               <a:rPr lang="en-US" smtClean="0"/>
-              <a:t>12/17/2022</a:t>
+              <a:t>12/19/2022</a:t>
             </a:fld>
             <a:endParaRPr lang="en-US"/>
           </a:p>
@@ -6703,7 +6921,7 @@
           <a:p>
             <a:fld id="{109E55A0-C911-4F03-82FC-7E5926047D46}" type="datetime1">
               <a:rPr lang="en-US" smtClean="0"/>
-              <a:t>12/17/2022</a:t>
+              <a:t>12/19/2022</a:t>
             </a:fld>
             <a:endParaRPr lang="en-US"/>
           </a:p>
@@ -6852,7 +7070,7 @@
           <a:p>
             <a:fld id="{2B7B7EE0-7771-4CD5-9B2B-3550753A54A1}" type="datetime1">
               <a:rPr lang="en-US" smtClean="0"/>
-              <a:t>12/17/2022</a:t>
+              <a:t>12/19/2022</a:t>
             </a:fld>
             <a:endParaRPr lang="en-US"/>
           </a:p>
@@ -7163,7 +7381,7 @@
           <a:p>
             <a:fld id="{F8B318B3-0E87-4416-A9B8-D891968C2727}" type="datetime1">
               <a:rPr lang="en-US" smtClean="0"/>
-              <a:t>12/17/2022</a:t>
+              <a:t>12/19/2022</a:t>
             </a:fld>
             <a:endParaRPr lang="en-US"/>
           </a:p>
@@ -7451,7 +7669,7 @@
           <a:p>
             <a:fld id="{EA476A42-A091-4468-A075-64A31BE59948}" type="datetime1">
               <a:rPr lang="en-US" smtClean="0"/>
-              <a:t>12/17/2022</a:t>
+              <a:t>12/19/2022</a:t>
             </a:fld>
             <a:endParaRPr lang="en-US"/>
           </a:p>
@@ -7692,7 +7910,7 @@
           <a:p>
             <a:fld id="{54D997E8-DDEE-43F1-8D9B-F8A1E11DE488}" type="datetime1">
               <a:rPr lang="en-US" smtClean="0"/>
-              <a:t>12/17/2022</a:t>
+              <a:t>12/19/2022</a:t>
             </a:fld>
             <a:endParaRPr lang="en-US"/>
           </a:p>
@@ -8944,26 +9162,14 @@
         </p:nvSpPr>
         <p:spPr/>
         <p:txBody>
-          <a:bodyPr/>
+          <a:bodyPr>
+            <a:normAutofit/>
+          </a:bodyPr>
           <a:lstStyle/>
           <a:p>
             <a:r>
               <a:rPr lang="en-US" dirty="0"/>
               <a:t>There will often be in-class exercises to give you practice with the technologies we will use.</a:t>
-            </a:r>
-          </a:p>
-          <a:p>
-            <a:r>
-              <a:rPr lang="en-US" dirty="0"/>
-              <a:t>In addition, there will be </a:t>
-            </a:r>
-            <a:r>
-              <a:rPr lang="en-US" b="1" dirty="0"/>
-              <a:t>tutorials</a:t>
-            </a:r>
-            <a:r>
-              <a:rPr lang="en-US" dirty="0"/>
-              <a:t> posted on the web.</a:t>
             </a:r>
           </a:p>
           <a:p>
@@ -8989,6 +9195,33 @@
               <a:rPr lang="en-US" dirty="0"/>
               <a:t>to grade in-class activities.</a:t>
             </a:r>
+          </a:p>
+          <a:p>
+            <a:r>
+              <a:rPr lang="en-US" dirty="0"/>
+              <a:t>In addition, there will be </a:t>
+            </a:r>
+            <a:r>
+              <a:rPr lang="en-US" b="1" dirty="0">
+                <a:solidFill>
+                  <a:srgbClr val="FF0000"/>
+                </a:solidFill>
+              </a:rPr>
+              <a:t>tutorials</a:t>
+            </a:r>
+            <a:r>
+              <a:rPr lang="en-US" dirty="0"/>
+              <a:t> posted on the web.</a:t>
+            </a:r>
+          </a:p>
+          <a:p>
+            <a:r>
+              <a:rPr lang="en-US" dirty="0"/>
+              <a:t>These will extend the in-class materials.</a:t>
+            </a:r>
+          </a:p>
+          <a:p>
+            <a:endParaRPr lang="en-US" dirty="0"/>
           </a:p>
           <a:p>
             <a:endParaRPr lang="en-US" dirty="0"/>
@@ -9104,7 +9337,7 @@
         <p:spPr/>
         <p:txBody>
           <a:bodyPr>
-            <a:normAutofit/>
+            <a:normAutofit lnSpcReduction="10000"/>
           </a:bodyPr>
           <a:lstStyle/>
           <a:p>
@@ -9122,7 +9355,7 @@
           <a:p>
             <a:r>
               <a:rPr lang="en-US" dirty="0"/>
-              <a:t>There will be an exam in Week 9.</a:t>
+              <a:t>There will be an exam in Week 9.  There will not be a final exam.</a:t>
             </a:r>
           </a:p>
           <a:p>
@@ -9135,7 +9368,7 @@
             <a:pPr lvl="1"/>
             <a:r>
               <a:rPr lang="en-US" dirty="0"/>
-              <a:t>30% Individual Projects (i.e., Assignments)</a:t>
+              <a:t>30% Individual Assignments (Individual Projects 1 and 2)</a:t>
             </a:r>
           </a:p>
           <a:p>
@@ -9156,7 +9389,7 @@
             <a:pPr lvl="1"/>
             <a:r>
               <a:rPr lang="en-US" dirty="0"/>
-              <a:t>20% Exam</a:t>
+              <a:t>20% Week 9 Exam</a:t>
             </a:r>
           </a:p>
         </p:txBody>
@@ -9249,11 +9482,19 @@
           <a:p>
             <a:r>
               <a:rPr lang="en-US" dirty="0"/>
-              <a:t>Introducing </a:t>
+              <a:t>We will use </a:t>
             </a:r>
             <a:r>
               <a:rPr lang="en-US" dirty="0" err="1"/>
-              <a:t>Covey.Town</a:t>
+              <a:t>covey.town</a:t>
+            </a:r>
+            <a:r>
+              <a:rPr lang="en-US" dirty="0"/>
+              <a:t> as the running codebase for </a:t>
+            </a:r>
+            <a:r>
+              <a:rPr lang="en-US"/>
+              <a:t>the course</a:t>
             </a:r>
             <a:endParaRPr lang="en-US" dirty="0"/>
           </a:p>
@@ -9283,54 +9524,135 @@
         </p:spPr>
         <p:txBody>
           <a:bodyPr>
-            <a:normAutofit lnSpcReduction="10000"/>
+            <a:normAutofit fontScale="77500" lnSpcReduction="20000"/>
           </a:bodyPr>
           <a:lstStyle/>
           <a:p>
             <a:r>
-              <a:rPr lang="en-US" dirty="0"/>
-              <a:t>Individual projects will help you become familiar with the codebase.</a:t>
-            </a:r>
-          </a:p>
-          <a:p>
-            <a:r>
-              <a:rPr lang="en-US" dirty="0"/>
-              <a:t>You will propose new features that will be implemented as part of team project</a:t>
-            </a:r>
-          </a:p>
-          <a:p>
-            <a:r>
-              <a:rPr lang="en-US" dirty="0"/>
-              <a:t>Further breakdown of team project grade (i.e., 40%) is:</a:t>
-            </a:r>
-          </a:p>
-          <a:p>
-            <a:pPr lvl="1"/>
-            <a:r>
-              <a:rPr lang="en-US" dirty="0"/>
-              <a:t>40% Features and Testing</a:t>
-            </a:r>
-          </a:p>
-          <a:p>
-            <a:pPr lvl="1"/>
-            <a:r>
-              <a:rPr lang="en-US" dirty="0"/>
-              <a:t>20% Project Plan</a:t>
-            </a:r>
-          </a:p>
-          <a:p>
-            <a:pPr lvl="1"/>
-            <a:r>
-              <a:rPr lang="en-US" dirty="0"/>
-              <a:t>20% Meetings and Evidence of work</a:t>
-            </a:r>
-          </a:p>
-          <a:p>
-            <a:pPr lvl="1"/>
-            <a:r>
-              <a:rPr lang="en-US" dirty="0"/>
-              <a:t>20% Report and Demo</a:t>
-            </a:r>
+              <a:rPr lang="en-US" dirty="0" err="1"/>
+              <a:t>Covey.Town</a:t>
+            </a:r>
+            <a:r>
+              <a:rPr lang="en-US" dirty="0"/>
+              <a:t> is a virtual meeting space.</a:t>
+            </a:r>
+          </a:p>
+          <a:p>
+            <a:r>
+              <a:rPr lang="en-US" b="0" i="0" dirty="0">
+                <a:solidFill>
+                  <a:srgbClr val="2D3B45"/>
+                </a:solidFill>
+                <a:effectLst/>
+                <a:latin typeface="Lato Extended"/>
+              </a:rPr>
+              <a:t>Different groups of people can have simultaneous video calls, allowing participants to drift between different conversations, just like in real life. </a:t>
+            </a:r>
+          </a:p>
+          <a:p>
+            <a:r>
+              <a:rPr lang="en-US" b="0" i="0" dirty="0">
+                <a:solidFill>
+                  <a:srgbClr val="2D3B45"/>
+                </a:solidFill>
+                <a:effectLst/>
+                <a:latin typeface="Lato Extended"/>
+              </a:rPr>
+              <a:t>Inspired by existing products like </a:t>
+            </a:r>
+            <a:r>
+              <a:rPr lang="en-US" b="0" i="0" u="sng" dirty="0" err="1">
+                <a:effectLst/>
+                <a:latin typeface="Lato Extended"/>
+              </a:rPr>
+              <a:t>Gather.Town</a:t>
+            </a:r>
+            <a:r>
+              <a:rPr lang="en-US" b="0" i="0" u="sng" dirty="0">
+                <a:effectLst/>
+                <a:latin typeface="Lato Extended"/>
+              </a:rPr>
+              <a:t> , </a:t>
+            </a:r>
+            <a:r>
+              <a:rPr lang="en-US" b="0" i="0" u="sng" dirty="0" err="1">
+                <a:effectLst/>
+                <a:latin typeface="Lato Extended"/>
+                <a:hlinkClick r:id="rId3"/>
+              </a:rPr>
+              <a:t>Sococo</a:t>
+            </a:r>
+            <a:r>
+              <a:rPr lang="en-US" b="0" i="0" dirty="0">
+                <a:solidFill>
+                  <a:srgbClr val="2D3B45"/>
+                </a:solidFill>
+                <a:effectLst/>
+                <a:latin typeface="Lato Extended"/>
+              </a:rPr>
+              <a:t>, and </a:t>
+            </a:r>
+            <a:r>
+              <a:rPr lang="en-US" b="0" i="0" u="sng" dirty="0">
+                <a:effectLst/>
+                <a:latin typeface="Lato Extended"/>
+                <a:hlinkClick r:id="rId4"/>
+              </a:rPr>
+              <a:t>Gatherly.IO</a:t>
+            </a:r>
+            <a:endParaRPr lang="en-US" b="0" i="0" u="sng" dirty="0">
+              <a:effectLst/>
+              <a:latin typeface="Lato Extended"/>
+            </a:endParaRPr>
+          </a:p>
+          <a:p>
+            <a:r>
+              <a:rPr lang="en-US" b="0" i="0" dirty="0">
+                <a:solidFill>
+                  <a:srgbClr val="2D3B45"/>
+                </a:solidFill>
+                <a:effectLst/>
+                <a:latin typeface="Lato Extended"/>
+              </a:rPr>
+              <a:t>But it is an open source effort </a:t>
+            </a:r>
+          </a:p>
+          <a:p>
+            <a:r>
+              <a:rPr lang="en-US" dirty="0">
+                <a:solidFill>
+                  <a:srgbClr val="2D3B45"/>
+                </a:solidFill>
+                <a:latin typeface="Lato Extended"/>
+              </a:rPr>
+              <a:t>T</a:t>
+            </a:r>
+            <a:r>
+              <a:rPr lang="en-US" b="0" i="0" dirty="0">
+                <a:solidFill>
+                  <a:srgbClr val="2D3B45"/>
+                </a:solidFill>
+                <a:effectLst/>
+                <a:latin typeface="Lato Extended"/>
+              </a:rPr>
+              <a:t>he features will be proposed and implemented by you! </a:t>
+            </a:r>
+          </a:p>
+          <a:p>
+            <a:r>
+              <a:rPr lang="en-US" b="0" i="0" dirty="0">
+                <a:solidFill>
+                  <a:srgbClr val="2D3B45"/>
+                </a:solidFill>
+                <a:effectLst/>
+                <a:latin typeface="Lato Extended"/>
+              </a:rPr>
+              <a:t>All implementation will take place in the TypeScript programming language, using React for the user interface.</a:t>
+            </a:r>
+            <a:endParaRPr lang="en-US" dirty="0"/>
+          </a:p>
+          <a:p>
+            <a:endParaRPr lang="en-US" dirty="0"/>
           </a:p>
         </p:txBody>
       </p:sp>
@@ -9384,7 +9706,7 @@
           <p:nvPr/>
         </p:nvPicPr>
         <p:blipFill>
-          <a:blip r:embed="rId3">
+          <a:blip r:embed="rId5">
             <a:extLst>
               <a:ext uri="{28A0092B-C50C-407E-A947-70E740481C1C}">
                 <a14:useLocalDpi xmlns:a14="http://schemas.microsoft.com/office/drawing/2010/main" val="0"/>
@@ -9440,7 +9762,7 @@
         </p:spPr>
         <p:txBody>
           <a:bodyPr vert="horz" lIns="91440" tIns="45720" rIns="91440" bIns="45720" rtlCol="0">
-            <a:normAutofit lnSpcReduction="10000"/>
+            <a:normAutofit/>
           </a:bodyPr>
           <a:lstStyle>
             <a:lvl1pPr marL="228600" indent="-228600" algn="l" defTabSz="914400" rtl="0" eaLnBrk="1" latinLnBrk="0" hangingPunct="1">
@@ -9607,21 +9929,21 @@
             </a:lvl9pPr>
           </a:lstStyle>
           <a:p>
-            <a:r>
-              <a:rPr lang="en-US" dirty="0">
-                <a:solidFill>
-                  <a:srgbClr val="FF0000"/>
-                </a:solidFill>
-              </a:rPr>
-              <a:t>Peer evaluations (surveys) may be utilized, and individual contributions WILL impact your project grade.</a:t>
-            </a:r>
+            <a:pPr marL="0" indent="0">
+              <a:buNone/>
+            </a:pPr>
+            <a:endParaRPr lang="en-US" dirty="0">
+              <a:solidFill>
+                <a:srgbClr val="FF0000"/>
+              </a:solidFill>
+            </a:endParaRPr>
           </a:p>
         </p:txBody>
       </p:sp>
     </p:spTree>
     <p:extLst>
       <p:ext uri="{BB962C8B-B14F-4D97-AF65-F5344CB8AC3E}">
-        <p14:creationId xmlns:p14="http://schemas.microsoft.com/office/powerpoint/2010/main" val="2527724101"/>
+        <p14:creationId xmlns:p14="http://schemas.microsoft.com/office/powerpoint/2010/main" val="3217851107"/>
       </p:ext>
     </p:extLst>
   </p:cSld>
@@ -9650,8 +9972,14 @@
       </p:grpSpPr>
       <p:sp>
         <p:nvSpPr>
-          <p:cNvPr id="253" name="Grade Appeal Policy"/>
-          <p:cNvSpPr txBox="1">
+          <p:cNvPr id="2" name="Title 1">
+            <a:extLst>
+              <a:ext uri="{FF2B5EF4-FFF2-40B4-BE49-F238E27FC236}">
+                <a16:creationId xmlns:a16="http://schemas.microsoft.com/office/drawing/2014/main" id="{46CF8AAD-C000-4577-AEBC-F85F657FFE8C}"/>
+              </a:ext>
+            </a:extLst>
+          </p:cNvPr>
+          <p:cNvSpPr>
             <a:spLocks noGrp="1"/>
           </p:cNvSpPr>
           <p:nvPr>
@@ -9661,130 +9989,128 @@
         <p:spPr/>
         <p:txBody>
           <a:bodyPr/>
-          <a:lstStyle>
-            <a:lvl1pPr>
-              <a:defRPr>
-                <a:solidFill>
-                  <a:srgbClr val="005493"/>
-                </a:solidFill>
-              </a:defRPr>
-            </a:lvl1pPr>
-          </a:lstStyle>
-          <a:p>
-            <a:r>
-              <a:rPr lang="en-US" dirty="0">
-                <a:solidFill>
-                  <a:srgbClr val="0070C0"/>
-                </a:solidFill>
-              </a:rPr>
-              <a:t>Grade Appeal Policy</a:t>
-            </a:r>
-          </a:p>
-        </p:txBody>
-      </p:sp>
-      <p:sp>
-        <p:nvSpPr>
-          <p:cNvPr id="254" name="scores for homeworks/projects/midterms will be final two weeks after it has been returned to you"/>
-          <p:cNvSpPr txBox="1">
+          <a:lstStyle/>
+          <a:p>
+            <a:r>
+              <a:rPr lang="en-US" dirty="0" err="1"/>
+              <a:t>Covey.Town</a:t>
+            </a:r>
+            <a:r>
+              <a:rPr lang="en-US" dirty="0"/>
+              <a:t> and you</a:t>
+            </a:r>
+          </a:p>
+        </p:txBody>
+      </p:sp>
+      <p:sp>
+        <p:nvSpPr>
+          <p:cNvPr id="3" name="Text Placeholder 2">
+            <a:extLst>
+              <a:ext uri="{FF2B5EF4-FFF2-40B4-BE49-F238E27FC236}">
+                <a16:creationId xmlns:a16="http://schemas.microsoft.com/office/drawing/2014/main" id="{3B13C7A6-A28D-4387-9F64-48979188D9B1}"/>
+              </a:ext>
+            </a:extLst>
+          </p:cNvPr>
+          <p:cNvSpPr>
             <a:spLocks noGrp="1"/>
           </p:cNvSpPr>
           <p:nvPr>
             <p:ph idx="1"/>
           </p:nvPr>
         </p:nvSpPr>
-        <p:spPr/>
+        <p:spPr>
+          <a:xfrm>
+            <a:off x="838199" y="1500160"/>
+            <a:ext cx="10331245" cy="4351338"/>
+          </a:xfrm>
+        </p:spPr>
         <p:txBody>
           <a:bodyPr>
             <a:normAutofit/>
           </a:bodyPr>
-          <a:lstStyle>
-            <a:lvl1pPr>
-              <a:defRPr>
-                <a:solidFill>
-                  <a:srgbClr val="000000"/>
-                </a:solidFill>
-              </a:defRPr>
-            </a:lvl1pPr>
-          </a:lstStyle>
-          <a:p>
-            <a:r>
-              <a:rPr lang="en-US" dirty="0"/>
-              <a:t>If you have concerns regarding the grading of your work, please let us know right away.</a:t>
+          <a:lstStyle/>
+          <a:p>
+            <a:r>
+              <a:rPr lang="en-US" dirty="0"/>
+              <a:t>The individual projects will help you become familiar with the codebase.</a:t>
+            </a:r>
+          </a:p>
+          <a:p>
+            <a:r>
+              <a:rPr lang="en-US" dirty="0"/>
+              <a:t>The team project will be a new feature that you will propose.</a:t>
+            </a:r>
+          </a:p>
+          <a:p>
+            <a:r>
+              <a:rPr lang="en-US" dirty="0"/>
+              <a:t>Further breakdown of team project grade (i.e., 40%) is:</a:t>
             </a:r>
           </a:p>
           <a:p>
             <a:pPr lvl="1"/>
             <a:r>
               <a:rPr lang="en-US" dirty="0"/>
-              <a:t>All regrade requests must be made through </a:t>
-            </a:r>
-            <a:r>
-              <a:rPr lang="en-US" dirty="0" err="1"/>
-              <a:t>Gradescope</a:t>
-            </a:r>
-            <a:r>
-              <a:rPr lang="en-US" dirty="0"/>
-              <a:t>.</a:t>
-            </a:r>
-          </a:p>
-          <a:p>
-            <a:pPr lvl="2"/>
-            <a:r>
-              <a:rPr lang="en-US" dirty="0" err="1"/>
-              <a:t>GradeScope</a:t>
-            </a:r>
-            <a:r>
-              <a:rPr lang="en-US" dirty="0"/>
-              <a:t> provides an interface that allows us to review all regrade requests in one place. </a:t>
+              <a:t>Planning (20%)</a:t>
             </a:r>
           </a:p>
           <a:p>
             <a:pPr lvl="1"/>
             <a:r>
               <a:rPr lang="en-US" dirty="0"/>
-              <a:t>Do </a:t>
-            </a:r>
+              <a:t>Process (20%)</a:t>
+            </a:r>
+          </a:p>
+          <a:p>
+            <a:pPr lvl="1"/>
+            <a:r>
+              <a:rPr lang="en-US" dirty="0"/>
+              <a:t>Product (40%)</a:t>
+            </a:r>
+          </a:p>
+          <a:p>
+            <a:pPr lvl="1"/>
+            <a:r>
+              <a:rPr lang="en-US" dirty="0"/>
+              <a:t>Reports (20%)</a:t>
+            </a:r>
+          </a:p>
+          <a:p>
             <a:r>
               <a:rPr lang="en-US" dirty="0">
                 <a:solidFill>
                   <a:srgbClr val="FF0000"/>
                 </a:solidFill>
               </a:rPr>
-              <a:t>not</a:t>
-            </a:r>
-            <a:r>
-              <a:rPr lang="en-US" dirty="0"/>
-              <a:t> post on Piazza or email your TA or instructor </a:t>
-            </a:r>
+              <a:t>Peer evaluations (surveys) may be utilized, and individual contributions WILL impact your project grade.</a:t>
+            </a:r>
+          </a:p>
+          <a:p>
+            <a:endParaRPr lang="en-US" dirty="0"/>
           </a:p>
           <a:p>
             <a:pPr lvl="1"/>
-            <a:r>
-              <a:rPr lang="en-US" dirty="0"/>
-              <a:t>All regrade requests must be submitted within </a:t>
-            </a:r>
-            <a:r>
-              <a:rPr lang="en-US" b="1" dirty="0"/>
-              <a:t>7 days </a:t>
-            </a:r>
-            <a:r>
-              <a:rPr lang="en-US" dirty="0"/>
-              <a:t>from your receipt of the graded work. </a:t>
-            </a:r>
+            <a:endParaRPr lang="en-US" dirty="0"/>
+          </a:p>
+          <a:p>
+            <a:endParaRPr lang="en-US" dirty="0"/>
           </a:p>
           <a:p>
             <a:pPr lvl="1"/>
-            <a:r>
-              <a:rPr lang="en-US" dirty="0"/>
-              <a:t>If your regrade request is closed and you feel that the response was not satisfactory, you may appeal to the instructor via email within 48 hours </a:t>
-            </a:r>
-          </a:p>
-        </p:txBody>
-      </p:sp>
-      <p:sp>
-        <p:nvSpPr>
-          <p:cNvPr id="255" name="Slide Number"/>
-          <p:cNvSpPr txBox="1">
+            <a:endParaRPr lang="en-US" dirty="0"/>
+          </a:p>
+        </p:txBody>
+      </p:sp>
+      <p:sp>
+        <p:nvSpPr>
+          <p:cNvPr id="7" name="Slide Number Placeholder 6">
+            <a:extLst>
+              <a:ext uri="{FF2B5EF4-FFF2-40B4-BE49-F238E27FC236}">
+                <a16:creationId xmlns:a16="http://schemas.microsoft.com/office/drawing/2014/main" id="{C3226C9D-2553-4272-88E2-CE134DEACCAB}"/>
+              </a:ext>
+            </a:extLst>
+          </p:cNvPr>
+          <p:cNvSpPr>
             <a:spLocks noGrp="1"/>
           </p:cNvSpPr>
           <p:nvPr>
@@ -9796,16 +10122,226 @@
           <a:bodyPr/>
           <a:lstStyle/>
           <a:p>
+            <a:pPr defTabSz="547695">
+              <a:defRPr/>
+            </a:pPr>
             <a:fld id="{86CB4B4D-7CA3-9044-876B-883B54F8677D}" type="slidenum">
-              <a:rPr lang="en-US"/>
-              <a:pPr/>
+              <a:rPr lang="en-US" smtClean="0"/>
+              <a:pPr defTabSz="547695">
+                <a:defRPr/>
+              </a:pPr>
               <a:t>17</a:t>
             </a:fld>
-            <a:endParaRPr lang="en-US"/>
+            <a:endParaRPr lang="en-US" dirty="0"/>
+          </a:p>
+        </p:txBody>
+      </p:sp>
+      <p:sp>
+        <p:nvSpPr>
+          <p:cNvPr id="5" name="Text Placeholder 2">
+            <a:extLst>
+              <a:ext uri="{FF2B5EF4-FFF2-40B4-BE49-F238E27FC236}">
+                <a16:creationId xmlns:a16="http://schemas.microsoft.com/office/drawing/2014/main" id="{9E3EB6B5-1CBD-EBF7-9E2B-FDF2FC9DBE96}"/>
+              </a:ext>
+            </a:extLst>
+          </p:cNvPr>
+          <p:cNvSpPr txBox="1">
+            <a:spLocks/>
+          </p:cNvSpPr>
+          <p:nvPr/>
+        </p:nvSpPr>
+        <p:spPr>
+          <a:xfrm>
+            <a:off x="838200" y="5641685"/>
+            <a:ext cx="10894742" cy="810746"/>
+          </a:xfrm>
+          <a:prstGeom prst="rect">
+            <a:avLst/>
+          </a:prstGeom>
+        </p:spPr>
+        <p:txBody>
+          <a:bodyPr vert="horz" lIns="91440" tIns="45720" rIns="91440" bIns="45720" rtlCol="0">
+            <a:normAutofit/>
+          </a:bodyPr>
+          <a:lstStyle>
+            <a:lvl1pPr marL="228600" indent="-228600" algn="l" defTabSz="914400" rtl="0" eaLnBrk="1" latinLnBrk="0" hangingPunct="1">
+              <a:lnSpc>
+                <a:spcPct val="90000"/>
+              </a:lnSpc>
+              <a:spcBef>
+                <a:spcPts val="1000"/>
+              </a:spcBef>
+              <a:buFont typeface="Arial" panose="020B0604020202020204" pitchFamily="34" charset="0"/>
+              <a:buChar char="•"/>
+              <a:defRPr sz="2800" kern="1200">
+                <a:solidFill>
+                  <a:schemeClr val="tx1"/>
+                </a:solidFill>
+                <a:latin typeface="+mn-lt"/>
+                <a:ea typeface="+mn-ea"/>
+                <a:cs typeface="+mn-cs"/>
+              </a:defRPr>
+            </a:lvl1pPr>
+            <a:lvl2pPr marL="685800" indent="-228600" algn="l" defTabSz="914400" rtl="0" eaLnBrk="1" latinLnBrk="0" hangingPunct="1">
+              <a:lnSpc>
+                <a:spcPct val="90000"/>
+              </a:lnSpc>
+              <a:spcBef>
+                <a:spcPts val="500"/>
+              </a:spcBef>
+              <a:buFont typeface="Arial" panose="020B0604020202020204" pitchFamily="34" charset="0"/>
+              <a:buChar char="•"/>
+              <a:defRPr sz="2400" kern="1200">
+                <a:solidFill>
+                  <a:schemeClr val="tx1"/>
+                </a:solidFill>
+                <a:latin typeface="+mn-lt"/>
+                <a:ea typeface="+mn-ea"/>
+                <a:cs typeface="+mn-cs"/>
+              </a:defRPr>
+            </a:lvl2pPr>
+            <a:lvl3pPr marL="1143000" indent="-228600" algn="l" defTabSz="914400" rtl="0" eaLnBrk="1" latinLnBrk="0" hangingPunct="1">
+              <a:lnSpc>
+                <a:spcPct val="90000"/>
+              </a:lnSpc>
+              <a:spcBef>
+                <a:spcPts val="500"/>
+              </a:spcBef>
+              <a:buFont typeface="Arial" panose="020B0604020202020204" pitchFamily="34" charset="0"/>
+              <a:buChar char="•"/>
+              <a:defRPr sz="2000" kern="1200">
+                <a:solidFill>
+                  <a:schemeClr val="tx1"/>
+                </a:solidFill>
+                <a:latin typeface="+mn-lt"/>
+                <a:ea typeface="+mn-ea"/>
+                <a:cs typeface="+mn-cs"/>
+              </a:defRPr>
+            </a:lvl3pPr>
+            <a:lvl4pPr marL="1600200" indent="-228600" algn="l" defTabSz="914400" rtl="0" eaLnBrk="1" latinLnBrk="0" hangingPunct="1">
+              <a:lnSpc>
+                <a:spcPct val="90000"/>
+              </a:lnSpc>
+              <a:spcBef>
+                <a:spcPts val="500"/>
+              </a:spcBef>
+              <a:buFont typeface="Arial" panose="020B0604020202020204" pitchFamily="34" charset="0"/>
+              <a:buChar char="•"/>
+              <a:defRPr sz="1800" kern="1200">
+                <a:solidFill>
+                  <a:schemeClr val="tx1"/>
+                </a:solidFill>
+                <a:latin typeface="+mn-lt"/>
+                <a:ea typeface="+mn-ea"/>
+                <a:cs typeface="+mn-cs"/>
+              </a:defRPr>
+            </a:lvl4pPr>
+            <a:lvl5pPr marL="2057400" indent="-228600" algn="l" defTabSz="914400" rtl="0" eaLnBrk="1" latinLnBrk="0" hangingPunct="1">
+              <a:lnSpc>
+                <a:spcPct val="90000"/>
+              </a:lnSpc>
+              <a:spcBef>
+                <a:spcPts val="500"/>
+              </a:spcBef>
+              <a:buFont typeface="Arial" panose="020B0604020202020204" pitchFamily="34" charset="0"/>
+              <a:buChar char="•"/>
+              <a:defRPr sz="1800" kern="1200">
+                <a:solidFill>
+                  <a:schemeClr val="tx1"/>
+                </a:solidFill>
+                <a:latin typeface="+mn-lt"/>
+                <a:ea typeface="+mn-ea"/>
+                <a:cs typeface="+mn-cs"/>
+              </a:defRPr>
+            </a:lvl5pPr>
+            <a:lvl6pPr marL="2514600" indent="-228600" algn="l" defTabSz="914400" rtl="0" eaLnBrk="1" latinLnBrk="0" hangingPunct="1">
+              <a:lnSpc>
+                <a:spcPct val="90000"/>
+              </a:lnSpc>
+              <a:spcBef>
+                <a:spcPts val="500"/>
+              </a:spcBef>
+              <a:buFont typeface="Arial" panose="020B0604020202020204" pitchFamily="34" charset="0"/>
+              <a:buChar char="•"/>
+              <a:defRPr sz="1800" kern="1200">
+                <a:solidFill>
+                  <a:schemeClr val="tx1"/>
+                </a:solidFill>
+                <a:latin typeface="+mn-lt"/>
+                <a:ea typeface="+mn-ea"/>
+                <a:cs typeface="+mn-cs"/>
+              </a:defRPr>
+            </a:lvl6pPr>
+            <a:lvl7pPr marL="2971800" indent="-228600" algn="l" defTabSz="914400" rtl="0" eaLnBrk="1" latinLnBrk="0" hangingPunct="1">
+              <a:lnSpc>
+                <a:spcPct val="90000"/>
+              </a:lnSpc>
+              <a:spcBef>
+                <a:spcPts val="500"/>
+              </a:spcBef>
+              <a:buFont typeface="Arial" panose="020B0604020202020204" pitchFamily="34" charset="0"/>
+              <a:buChar char="•"/>
+              <a:defRPr sz="1800" kern="1200">
+                <a:solidFill>
+                  <a:schemeClr val="tx1"/>
+                </a:solidFill>
+                <a:latin typeface="+mn-lt"/>
+                <a:ea typeface="+mn-ea"/>
+                <a:cs typeface="+mn-cs"/>
+              </a:defRPr>
+            </a:lvl7pPr>
+            <a:lvl8pPr marL="3429000" indent="-228600" algn="l" defTabSz="914400" rtl="0" eaLnBrk="1" latinLnBrk="0" hangingPunct="1">
+              <a:lnSpc>
+                <a:spcPct val="90000"/>
+              </a:lnSpc>
+              <a:spcBef>
+                <a:spcPts val="500"/>
+              </a:spcBef>
+              <a:buFont typeface="Arial" panose="020B0604020202020204" pitchFamily="34" charset="0"/>
+              <a:buChar char="•"/>
+              <a:defRPr sz="1800" kern="1200">
+                <a:solidFill>
+                  <a:schemeClr val="tx1"/>
+                </a:solidFill>
+                <a:latin typeface="+mn-lt"/>
+                <a:ea typeface="+mn-ea"/>
+                <a:cs typeface="+mn-cs"/>
+              </a:defRPr>
+            </a:lvl8pPr>
+            <a:lvl9pPr marL="3886200" indent="-228600" algn="l" defTabSz="914400" rtl="0" eaLnBrk="1" latinLnBrk="0" hangingPunct="1">
+              <a:lnSpc>
+                <a:spcPct val="90000"/>
+              </a:lnSpc>
+              <a:spcBef>
+                <a:spcPts val="500"/>
+              </a:spcBef>
+              <a:buFont typeface="Arial" panose="020B0604020202020204" pitchFamily="34" charset="0"/>
+              <a:buChar char="•"/>
+              <a:defRPr sz="1800" kern="1200">
+                <a:solidFill>
+                  <a:schemeClr val="tx1"/>
+                </a:solidFill>
+                <a:latin typeface="+mn-lt"/>
+                <a:ea typeface="+mn-ea"/>
+                <a:cs typeface="+mn-cs"/>
+              </a:defRPr>
+            </a:lvl9pPr>
+          </a:lstStyle>
+          <a:p>
+            <a:endParaRPr lang="en-US" dirty="0">
+              <a:solidFill>
+                <a:srgbClr val="FF0000"/>
+              </a:solidFill>
+            </a:endParaRPr>
           </a:p>
         </p:txBody>
       </p:sp>
     </p:spTree>
+    <p:extLst>
+      <p:ext uri="{BB962C8B-B14F-4D97-AF65-F5344CB8AC3E}">
+        <p14:creationId xmlns:p14="http://schemas.microsoft.com/office/powerpoint/2010/main" val="2527724101"/>
+      </p:ext>
+    </p:extLst>
   </p:cSld>
   <p:clrMapOvr>
     <a:masterClrMapping/>
@@ -9832,7 +10368,7 @@
       </p:grpSpPr>
       <p:sp>
         <p:nvSpPr>
-          <p:cNvPr id="257" name="Late Policy"/>
+          <p:cNvPr id="253" name="Grade Appeal Policy"/>
           <p:cNvSpPr txBox="1">
             <a:spLocks noGrp="1"/>
           </p:cNvSpPr>
@@ -9859,14 +10395,14 @@
                   <a:srgbClr val="0070C0"/>
                 </a:solidFill>
               </a:rPr>
-              <a:t>Late Policy</a:t>
-            </a:r>
-          </a:p>
-        </p:txBody>
-      </p:sp>
-      <p:sp>
-        <p:nvSpPr>
-          <p:cNvPr id="258" name="Your work is late if it is not turned in by the deadline. The official clock is the time on the submission tool (github.ccs.neu.edu).…"/>
+              <a:t>Grade Appeal Policy</a:t>
+            </a:r>
+          </a:p>
+        </p:txBody>
+      </p:sp>
+      <p:sp>
+        <p:nvSpPr>
+          <p:cNvPr id="254" name="scores for homeworks/projects/midterms will be final two weeks after it has been returned to you"/>
           <p:cNvSpPr txBox="1">
             <a:spLocks noGrp="1"/>
           </p:cNvSpPr>
@@ -9874,90 +10410,98 @@
             <p:ph idx="1"/>
           </p:nvPr>
         </p:nvSpPr>
-        <p:spPr>
-          <a:xfrm>
-            <a:off x="838200" y="1500160"/>
-            <a:ext cx="8662639" cy="4856190"/>
-          </a:xfrm>
-        </p:spPr>
+        <p:spPr/>
         <p:txBody>
           <a:bodyPr>
             <a:normAutofit/>
           </a:bodyPr>
-          <a:lstStyle/>
-          <a:p>
-            <a:r>
-              <a:rPr lang="en-US" dirty="0"/>
-              <a:t>Your work is </a:t>
+          <a:lstStyle>
+            <a:lvl1pPr>
+              <a:defRPr>
+                <a:solidFill>
+                  <a:srgbClr val="000000"/>
+                </a:solidFill>
+              </a:defRPr>
+            </a:lvl1pPr>
+          </a:lstStyle>
+          <a:p>
+            <a:r>
+              <a:rPr lang="en-US" dirty="0"/>
+              <a:t>If you have concerns regarding the grading of your work, please let us know right away.</a:t>
+            </a:r>
+          </a:p>
+          <a:p>
+            <a:pPr lvl="1"/>
+            <a:r>
+              <a:rPr lang="en-US" dirty="0"/>
+              <a:t>All regrade requests must be made through </a:t>
+            </a:r>
+            <a:r>
+              <a:rPr lang="en-US" dirty="0" err="1"/>
+              <a:t>Gradescope</a:t>
+            </a:r>
+            <a:r>
+              <a:rPr lang="en-US" dirty="0"/>
+              <a:t>.</a:t>
+            </a:r>
+          </a:p>
+          <a:p>
+            <a:pPr lvl="2"/>
+            <a:r>
+              <a:rPr lang="en-US" dirty="0" err="1"/>
+              <a:t>GradeScope</a:t>
+            </a:r>
+            <a:r>
+              <a:rPr lang="en-US" dirty="0"/>
+              <a:t> provides an interface that allows us to review all regrade requests in one place. </a:t>
+            </a:r>
+          </a:p>
+          <a:p>
+            <a:pPr lvl="1"/>
+            <a:r>
+              <a:rPr lang="en-US" dirty="0"/>
+              <a:t>Do </a:t>
+            </a:r>
+            <a:r>
+              <a:rPr lang="en-US" dirty="0">
+                <a:solidFill>
+                  <a:srgbClr val="FF0000"/>
+                </a:solidFill>
+              </a:rPr>
+              <a:t>not</a:t>
+            </a:r>
+            <a:r>
+              <a:rPr lang="en-US" dirty="0"/>
+              <a:t> post on Piazza or email your TA or instructor </a:t>
+            </a:r>
+          </a:p>
+          <a:p>
+            <a:pPr lvl="1"/>
+            <a:r>
+              <a:rPr lang="en-US" dirty="0"/>
+              <a:t>All regrade requests must be submitted within </a:t>
             </a:r>
             <a:r>
               <a:rPr lang="en-US" b="1" dirty="0"/>
-              <a:t>late</a:t>
-            </a:r>
-            <a:r>
-              <a:rPr lang="en-US" dirty="0"/>
-              <a:t> if it is not turned in by the deadline. </a:t>
+              <a:t>7 days </a:t>
+            </a:r>
+            <a:r>
+              <a:rPr lang="en-US" dirty="0"/>
+              <a:t>from your receipt of the graded work. </a:t>
             </a:r>
           </a:p>
           <a:p>
             <a:pPr lvl="1"/>
             <a:r>
               <a:rPr lang="en-US" dirty="0"/>
-              <a:t>10% will be deducted for late HW (individual assignments) turned in within 24 hours after the due date </a:t>
-            </a:r>
-          </a:p>
-          <a:p>
-            <a:pPr lvl="1"/>
-            <a:r>
-              <a:rPr lang="en-US" dirty="0"/>
-              <a:t>Individual assignments submitted more than 24 hours late will receive a zero.</a:t>
-            </a:r>
-          </a:p>
-          <a:p>
-            <a:pPr lvl="1"/>
-            <a:r>
-              <a:rPr lang="en-US" dirty="0"/>
-              <a:t>If you're worried about being busy around the time of a HW submission, please plan ahead and get started early.</a:t>
-            </a:r>
-          </a:p>
-          <a:p>
-            <a:pPr lvl="1"/>
-            <a:r>
-              <a:rPr lang="en-US" dirty="0"/>
-              <a:t>No late submissions allowed for any </a:t>
-            </a:r>
-            <a:r>
-              <a:rPr lang="en-US" b="1" dirty="0"/>
-              <a:t>group work</a:t>
-            </a:r>
-          </a:p>
-          <a:p>
-            <a:pPr lvl="1"/>
-            <a:r>
-              <a:rPr lang="en-US" dirty="0"/>
-              <a:t>If you have an accommodation from Disability </a:t>
-            </a:r>
-            <a:r>
-              <a:rPr lang="en-US"/>
-              <a:t>Resource Center, </a:t>
-            </a:r>
-            <a:r>
-              <a:rPr lang="en-US" dirty="0"/>
-              <a:t>you must request it from the instructors separately for each assignment or exam.</a:t>
-            </a:r>
-          </a:p>
-          <a:p>
-            <a:pPr lvl="2"/>
-            <a:r>
-              <a:rPr lang="en-US" dirty="0"/>
-              <a:t>DRC Accommodations are usually NOT available for Group Assignments</a:t>
-            </a:r>
-          </a:p>
-        </p:txBody>
-      </p:sp>
-      <p:sp>
-        <p:nvSpPr>
-          <p:cNvPr id="259" name="Slide Number"/>
+              <a:t>If your regrade request is closed and you feel that the response was not satisfactory, you may appeal to the instructor via email within 48 hours </a:t>
+            </a:r>
+          </a:p>
+        </p:txBody>
+      </p:sp>
+      <p:sp>
+        <p:nvSpPr>
+          <p:cNvPr id="255" name="Slide Number"/>
           <p:cNvSpPr txBox="1">
             <a:spLocks noGrp="1"/>
           </p:cNvSpPr>
@@ -10006,18 +10550,137 @@
       </p:grpSpPr>
       <p:sp>
         <p:nvSpPr>
-          <p:cNvPr id="2" name="Title 1">
-            <a:extLst>
-              <a:ext uri="{FF2B5EF4-FFF2-40B4-BE49-F238E27FC236}">
-                <a16:creationId xmlns:a16="http://schemas.microsoft.com/office/drawing/2014/main" id="{8DAD8E7C-85CF-4AF5-8090-304D54E13733}"/>
-              </a:ext>
-            </a:extLst>
-          </p:cNvPr>
-          <p:cNvSpPr>
+          <p:cNvPr id="257" name="Late Policy"/>
+          <p:cNvSpPr txBox="1">
             <a:spLocks noGrp="1"/>
           </p:cNvSpPr>
           <p:nvPr>
             <p:ph type="title"/>
+          </p:nvPr>
+        </p:nvSpPr>
+        <p:spPr/>
+        <p:txBody>
+          <a:bodyPr/>
+          <a:lstStyle>
+            <a:lvl1pPr>
+              <a:defRPr>
+                <a:solidFill>
+                  <a:srgbClr val="005493"/>
+                </a:solidFill>
+              </a:defRPr>
+            </a:lvl1pPr>
+          </a:lstStyle>
+          <a:p>
+            <a:r>
+              <a:rPr lang="en-US" dirty="0">
+                <a:solidFill>
+                  <a:srgbClr val="0070C0"/>
+                </a:solidFill>
+              </a:rPr>
+              <a:t>Late Policy</a:t>
+            </a:r>
+          </a:p>
+        </p:txBody>
+      </p:sp>
+      <p:sp>
+        <p:nvSpPr>
+          <p:cNvPr id="258" name="Your work is late if it is not turned in by the deadline. The official clock is the time on the submission tool (github.ccs.neu.edu).…"/>
+          <p:cNvSpPr txBox="1">
+            <a:spLocks noGrp="1"/>
+          </p:cNvSpPr>
+          <p:nvPr>
+            <p:ph idx="1"/>
+          </p:nvPr>
+        </p:nvSpPr>
+        <p:spPr>
+          <a:xfrm>
+            <a:off x="838200" y="1500160"/>
+            <a:ext cx="8662639" cy="4856190"/>
+          </a:xfrm>
+        </p:spPr>
+        <p:txBody>
+          <a:bodyPr>
+            <a:normAutofit/>
+          </a:bodyPr>
+          <a:lstStyle/>
+          <a:p>
+            <a:r>
+              <a:rPr lang="en-US" dirty="0"/>
+              <a:t>Your work is </a:t>
+            </a:r>
+            <a:r>
+              <a:rPr lang="en-US" b="1" dirty="0"/>
+              <a:t>late</a:t>
+            </a:r>
+            <a:r>
+              <a:rPr lang="en-US" dirty="0"/>
+              <a:t> if it is not turned in by the deadline. </a:t>
+            </a:r>
+          </a:p>
+          <a:p>
+            <a:pPr lvl="1"/>
+            <a:r>
+              <a:rPr lang="en-US" dirty="0"/>
+              <a:t>10% will be deducted for late HW (individual assignments) turned in within 24 hours after the due date </a:t>
+            </a:r>
+          </a:p>
+          <a:p>
+            <a:pPr lvl="1"/>
+            <a:r>
+              <a:rPr lang="en-US" dirty="0"/>
+              <a:t>Individual assignments submitted more than 24 hours late will receive a zero.</a:t>
+            </a:r>
+          </a:p>
+          <a:p>
+            <a:pPr lvl="1"/>
+            <a:r>
+              <a:rPr lang="en-US" dirty="0"/>
+              <a:t>If you're worried about being busy around the time of a HW submission, please plan ahead and get started early.</a:t>
+            </a:r>
+          </a:p>
+          <a:p>
+            <a:pPr lvl="1"/>
+            <a:r>
+              <a:rPr lang="en-US" dirty="0"/>
+              <a:t>No late submissions allowed for any </a:t>
+            </a:r>
+            <a:r>
+              <a:rPr lang="en-US" b="1" dirty="0"/>
+              <a:t>group work</a:t>
+            </a:r>
+          </a:p>
+          <a:p>
+            <a:pPr lvl="1"/>
+            <a:r>
+              <a:rPr lang="en-US" dirty="0"/>
+              <a:t>If you have an accommodation from Disability </a:t>
+            </a:r>
+            <a:r>
+              <a:rPr lang="en-US"/>
+              <a:t>Resource Center, </a:t>
+            </a:r>
+            <a:r>
+              <a:rPr lang="en-US" dirty="0"/>
+              <a:t>you must request it from the instructors separately for each assignment or exam.</a:t>
+            </a:r>
+          </a:p>
+          <a:p>
+            <a:pPr lvl="2"/>
+            <a:r>
+              <a:rPr lang="en-US" dirty="0"/>
+              <a:t>DRC Accommodations are usually NOT available for Group Assignments</a:t>
+            </a:r>
+          </a:p>
+        </p:txBody>
+      </p:sp>
+      <p:sp>
+        <p:nvSpPr>
+          <p:cNvPr id="259" name="Slide Number"/>
+          <p:cNvSpPr txBox="1">
+            <a:spLocks noGrp="1"/>
+          </p:cNvSpPr>
+          <p:nvPr>
+            <p:ph type="sldNum" sz="quarter" idx="12"/>
           </p:nvPr>
         </p:nvSpPr>
         <p:spPr/>
@@ -10025,114 +10688,9 @@
           <a:bodyPr/>
           <a:lstStyle/>
           <a:p>
-            <a:r>
-              <a:rPr lang="en-US" dirty="0"/>
-              <a:t>Academic Integrity (1)</a:t>
-            </a:r>
-          </a:p>
-        </p:txBody>
-      </p:sp>
-      <p:sp>
-        <p:nvSpPr>
-          <p:cNvPr id="3" name="Text Placeholder 2">
-            <a:extLst>
-              <a:ext uri="{FF2B5EF4-FFF2-40B4-BE49-F238E27FC236}">
-                <a16:creationId xmlns:a16="http://schemas.microsoft.com/office/drawing/2014/main" id="{F3F41972-2455-48E2-B0C8-0C2FD08B1049}"/>
-              </a:ext>
-            </a:extLst>
-          </p:cNvPr>
-          <p:cNvSpPr>
-            <a:spLocks noGrp="1"/>
-          </p:cNvSpPr>
-          <p:nvPr>
-            <p:ph idx="1"/>
-          </p:nvPr>
-        </p:nvSpPr>
-        <p:spPr/>
-        <p:txBody>
-          <a:bodyPr>
-            <a:normAutofit fontScale="92500" lnSpcReduction="10000"/>
-          </a:bodyPr>
-          <a:lstStyle/>
-          <a:p>
-            <a:r>
-              <a:rPr lang="en-US" dirty="0"/>
-              <a:t>Students must work individually on all homework assignments.</a:t>
-            </a:r>
-          </a:p>
-          <a:p>
-            <a:r>
-              <a:rPr lang="en-US" dirty="0"/>
-              <a:t>We encourage you to have high-level discussions with other students in the class about the assignments, however, we require that when you turn in an assignment, it is only your work. That is, copying any part of another student's assignment is strictly prohibited.</a:t>
-            </a:r>
-          </a:p>
-          <a:p>
-            <a:r>
-              <a:rPr lang="en-US" dirty="0"/>
-              <a:t>If you steal someone else's work, you </a:t>
-            </a:r>
-            <a:r>
-              <a:rPr lang="en-US" dirty="0">
-                <a:solidFill>
-                  <a:srgbClr val="FF0000"/>
-                </a:solidFill>
-              </a:rPr>
-              <a:t>fail </a:t>
-            </a:r>
-            <a:r>
-              <a:rPr lang="en-US" dirty="0"/>
-              <a:t>the class.</a:t>
-            </a:r>
-          </a:p>
-          <a:p>
-            <a:r>
-              <a:rPr lang="en-US" dirty="0"/>
-              <a:t>You are responsible for protecting your work. If someone uses your work, with or without your permission, you </a:t>
-            </a:r>
-            <a:r>
-              <a:rPr lang="en-US" dirty="0">
-                <a:solidFill>
-                  <a:srgbClr val="FF0000"/>
-                </a:solidFill>
-              </a:rPr>
-              <a:t>fail</a:t>
-            </a:r>
-            <a:r>
-              <a:rPr lang="en-US" dirty="0"/>
-              <a:t> the class.</a:t>
-            </a:r>
-          </a:p>
-        </p:txBody>
-      </p:sp>
-      <p:sp>
-        <p:nvSpPr>
-          <p:cNvPr id="4" name="Slide Number Placeholder 3">
-            <a:extLst>
-              <a:ext uri="{FF2B5EF4-FFF2-40B4-BE49-F238E27FC236}">
-                <a16:creationId xmlns:a16="http://schemas.microsoft.com/office/drawing/2014/main" id="{34D72AC8-7059-4398-976F-9B0E0D6DABC0}"/>
-              </a:ext>
-            </a:extLst>
-          </p:cNvPr>
-          <p:cNvSpPr>
-            <a:spLocks noGrp="1"/>
-          </p:cNvSpPr>
-          <p:nvPr>
-            <p:ph type="sldNum" sz="quarter" idx="12"/>
-          </p:nvPr>
-        </p:nvSpPr>
-        <p:spPr/>
-        <p:txBody>
-          <a:bodyPr/>
-          <a:lstStyle/>
-          <a:p>
-            <a:pPr defTabSz="547695">
-              <a:defRPr/>
-            </a:pPr>
             <a:fld id="{86CB4B4D-7CA3-9044-876B-883B54F8677D}" type="slidenum">
-              <a:rPr lang="en-US" smtClean="0"/>
-              <a:pPr defTabSz="547695">
-                <a:defRPr/>
-              </a:pPr>
+              <a:rPr lang="en-US"/>
+              <a:pPr/>
               <a:t>19</a:t>
             </a:fld>
             <a:endParaRPr lang="en-US"/>
@@ -10140,11 +10698,6 @@
         </p:txBody>
       </p:sp>
     </p:spTree>
-    <p:extLst>
-      <p:ext uri="{BB962C8B-B14F-4D97-AF65-F5344CB8AC3E}">
-        <p14:creationId xmlns:p14="http://schemas.microsoft.com/office/powerpoint/2010/main" val="4223183005"/>
-      </p:ext>
-    </p:extLst>
   </p:cSld>
   <p:clrMapOvr>
     <a:masterClrMapping/>
@@ -10592,7 +11145,7 @@
           <p:cNvPr id="2" name="Title 1">
             <a:extLst>
               <a:ext uri="{FF2B5EF4-FFF2-40B4-BE49-F238E27FC236}">
-                <a16:creationId xmlns:a16="http://schemas.microsoft.com/office/drawing/2014/main" id="{0C6E9E53-F40E-46F3-8B32-BE0138F441B1}"/>
+                <a16:creationId xmlns:a16="http://schemas.microsoft.com/office/drawing/2014/main" id="{8DAD8E7C-85CF-4AF5-8090-304D54E13733}"/>
               </a:ext>
             </a:extLst>
           </p:cNvPr>
@@ -10610,7 +11163,7 @@
           <a:p>
             <a:r>
               <a:rPr lang="en-US" dirty="0"/>
-              <a:t>Academic Integrity (2)</a:t>
+              <a:t>Academic Integrity (1)</a:t>
             </a:r>
           </a:p>
         </p:txBody>
@@ -10620,7 +11173,7 @@
           <p:cNvPr id="3" name="Text Placeholder 2">
             <a:extLst>
               <a:ext uri="{FF2B5EF4-FFF2-40B4-BE49-F238E27FC236}">
-                <a16:creationId xmlns:a16="http://schemas.microsoft.com/office/drawing/2014/main" id="{9BD682CD-7D52-49E3-A660-C4CB4A35F3AD}"/>
+                <a16:creationId xmlns:a16="http://schemas.microsoft.com/office/drawing/2014/main" id="{F3F41972-2455-48E2-B0C8-0C2FD08B1049}"/>
               </a:ext>
             </a:extLst>
           </p:cNvPr>
@@ -10634,37 +11187,56 @@
         <p:spPr/>
         <p:txBody>
           <a:bodyPr>
-            <a:normAutofit/>
+            <a:normAutofit fontScale="92500" lnSpcReduction="10000"/>
           </a:bodyPr>
           <a:lstStyle/>
           <a:p>
             <a:r>
               <a:rPr lang="en-US" dirty="0"/>
-              <a:t>You are free to reuse small snippets of example code found on the Internet (e.g., via </a:t>
-            </a:r>
-            <a:r>
-              <a:rPr lang="en-US" dirty="0" err="1"/>
-              <a:t>StackOverflow</a:t>
-            </a:r>
-            <a:r>
-              <a:rPr lang="en-US" dirty="0"/>
-              <a:t>) provided that it is attributed. </a:t>
-            </a:r>
-          </a:p>
-          <a:p>
-            <a:r>
-              <a:rPr lang="en-US" dirty="0"/>
-              <a:t>If you are concerned that by reusing and attributing that copied code it may appear that you didn't complete the assignment yourself, then please raise a discussion with the instructor.</a:t>
-            </a:r>
-          </a:p>
-          <a:p>
-            <a:r>
-              <a:rPr lang="en-US" dirty="0"/>
-              <a:t> If you are in doubt whether using others' work is allowed, you should assume that it is NOT allowed unless the instructors confirm otherwise.</a:t>
-            </a:r>
-          </a:p>
-          <a:p>
-            <a:endParaRPr lang="en-US" dirty="0"/>
+              <a:t>Students must work individually on all homework assignments.</a:t>
+            </a:r>
+          </a:p>
+          <a:p>
+            <a:r>
+              <a:rPr lang="en-US" dirty="0"/>
+              <a:t>We encourage you to have high-level discussions with other students in the class about the assignments, however, we require that when you turn in an assignment, it is only your work. That is, copying any part of another student's assignment is strictly prohibited.</a:t>
+            </a:r>
+          </a:p>
+          <a:p>
+            <a:r>
+              <a:rPr lang="en-US" dirty="0"/>
+              <a:t>If you steal someone else's work, you </a:t>
+            </a:r>
+            <a:r>
+              <a:rPr lang="en-US" dirty="0">
+                <a:solidFill>
+                  <a:srgbClr val="FF0000"/>
+                </a:solidFill>
+              </a:rPr>
+              <a:t>fail </a:t>
+            </a:r>
+            <a:r>
+              <a:rPr lang="en-US" dirty="0"/>
+              <a:t>the class.</a:t>
+            </a:r>
+          </a:p>
+          <a:p>
+            <a:r>
+              <a:rPr lang="en-US" dirty="0"/>
+              <a:t>You are responsible for protecting your work. If someone uses your work, with or without your permission, you </a:t>
+            </a:r>
+            <a:r>
+              <a:rPr lang="en-US" dirty="0">
+                <a:solidFill>
+                  <a:srgbClr val="FF0000"/>
+                </a:solidFill>
+              </a:rPr>
+              <a:t>fail</a:t>
+            </a:r>
+            <a:r>
+              <a:rPr lang="en-US" dirty="0"/>
+              <a:t> the class.</a:t>
+            </a:r>
           </a:p>
         </p:txBody>
       </p:sp>
@@ -10673,7 +11245,7 @@
           <p:cNvPr id="4" name="Slide Number Placeholder 3">
             <a:extLst>
               <a:ext uri="{FF2B5EF4-FFF2-40B4-BE49-F238E27FC236}">
-                <a16:creationId xmlns:a16="http://schemas.microsoft.com/office/drawing/2014/main" id="{B061B1C6-5E6F-4408-9C79-8B3E2C5DE989}"/>
+                <a16:creationId xmlns:a16="http://schemas.microsoft.com/office/drawing/2014/main" id="{34D72AC8-7059-4398-976F-9B0E0D6DABC0}"/>
               </a:ext>
             </a:extLst>
           </p:cNvPr>
@@ -10706,7 +11278,7 @@
     </p:spTree>
     <p:extLst>
       <p:ext uri="{BB962C8B-B14F-4D97-AF65-F5344CB8AC3E}">
-        <p14:creationId xmlns:p14="http://schemas.microsoft.com/office/powerpoint/2010/main" val="1665633817"/>
+        <p14:creationId xmlns:p14="http://schemas.microsoft.com/office/powerpoint/2010/main" val="4223183005"/>
       </p:ext>
     </p:extLst>
   </p:cSld>
@@ -10738,7 +11310,7 @@
           <p:cNvPr id="2" name="Title 1">
             <a:extLst>
               <a:ext uri="{FF2B5EF4-FFF2-40B4-BE49-F238E27FC236}">
-                <a16:creationId xmlns:a16="http://schemas.microsoft.com/office/drawing/2014/main" id="{1DD99648-CE8F-4E19-953E-8B3920440319}"/>
+                <a16:creationId xmlns:a16="http://schemas.microsoft.com/office/drawing/2014/main" id="{0C6E9E53-F40E-46F3-8B32-BE0138F441B1}"/>
               </a:ext>
             </a:extLst>
           </p:cNvPr>
@@ -10756,17 +11328,17 @@
           <a:p>
             <a:r>
               <a:rPr lang="en-US" dirty="0"/>
-              <a:t>Communication</a:t>
-            </a:r>
-          </a:p>
-        </p:txBody>
-      </p:sp>
-      <p:sp>
-        <p:nvSpPr>
-          <p:cNvPr id="3" name="Content Placeholder 2">
+              <a:t>Academic Integrity (2)</a:t>
+            </a:r>
+          </a:p>
+        </p:txBody>
+      </p:sp>
+      <p:sp>
+        <p:nvSpPr>
+          <p:cNvPr id="3" name="Text Placeholder 2">
             <a:extLst>
               <a:ext uri="{FF2B5EF4-FFF2-40B4-BE49-F238E27FC236}">
-                <a16:creationId xmlns:a16="http://schemas.microsoft.com/office/drawing/2014/main" id="{82CC43D4-82B4-449F-8A4A-151724B1D9F3}"/>
+                <a16:creationId xmlns:a16="http://schemas.microsoft.com/office/drawing/2014/main" id="{9BD682CD-7D52-49E3-A660-C4CB4A35F3AD}"/>
               </a:ext>
             </a:extLst>
           </p:cNvPr>
@@ -10777,12 +11349,7 @@
             <p:ph idx="1"/>
           </p:nvPr>
         </p:nvSpPr>
-        <p:spPr>
-          <a:xfrm>
-            <a:off x="838199" y="1500160"/>
-            <a:ext cx="10515599" cy="4351338"/>
-          </a:xfrm>
-        </p:spPr>
+        <p:spPr/>
         <p:txBody>
           <a:bodyPr>
             <a:normAutofit/>
@@ -10791,56 +11358,30 @@
           <a:p>
             <a:r>
               <a:rPr lang="en-US" dirty="0"/>
-              <a:t>Canvas</a:t>
-            </a:r>
-          </a:p>
-          <a:p>
-            <a:r>
-              <a:rPr lang="en-US" dirty="0"/>
-              <a:t>Course web page (</a:t>
-            </a:r>
-            <a:r>
-              <a:rPr lang="en-US" dirty="0">
-                <a:hlinkClick r:id="rId2"/>
-              </a:rPr>
-              <a:t>https://neu-se.github.io/CS4530-Spring-2023</a:t>
-            </a:r>
-            <a:r>
-              <a:rPr lang="en-US" dirty="0"/>
-              <a:t>)</a:t>
-            </a:r>
-          </a:p>
-          <a:p>
-            <a:pPr lvl="1"/>
-            <a:r>
-              <a:rPr lang="en-US" dirty="0"/>
-              <a:t>Canvas and the course web site will mirror each other.</a:t>
-            </a:r>
-          </a:p>
-          <a:p>
-            <a:pPr lvl="1"/>
-            <a:r>
-              <a:rPr lang="en-US" dirty="0"/>
-              <a:t>Assignments, important notices, etc., will appear in both places.</a:t>
-            </a:r>
-          </a:p>
-          <a:p>
-            <a:r>
-              <a:rPr lang="en-US" dirty="0"/>
-              <a:t>Piazza (see Canvas for link)</a:t>
-            </a:r>
-          </a:p>
-          <a:p>
-            <a:pPr lvl="1"/>
-            <a:r>
-              <a:rPr lang="en-US" dirty="0"/>
-              <a:t>for questions about assignments, projects, etc.</a:t>
-            </a:r>
-          </a:p>
-          <a:p>
-            <a:pPr marL="0" indent="0">
-              <a:buNone/>
-            </a:pPr>
+              <a:t>You are free to reuse small snippets of example code found on the Internet (e.g., via </a:t>
+            </a:r>
+            <a:r>
+              <a:rPr lang="en-US" dirty="0" err="1"/>
+              <a:t>StackOverflow</a:t>
+            </a:r>
+            <a:r>
+              <a:rPr lang="en-US" dirty="0"/>
+              <a:t>) provided that it is attributed. </a:t>
+            </a:r>
+          </a:p>
+          <a:p>
+            <a:r>
+              <a:rPr lang="en-US" dirty="0"/>
+              <a:t>If you are concerned that by reusing and attributing that copied code it may appear that you didn't complete the assignment yourself, then please raise a discussion with the instructor.</a:t>
+            </a:r>
+          </a:p>
+          <a:p>
+            <a:r>
+              <a:rPr lang="en-US" dirty="0"/>
+              <a:t> If you are in doubt whether using others' work is allowed, you should assume that it is NOT allowed unless the instructors confirm otherwise.</a:t>
+            </a:r>
+          </a:p>
+          <a:p>
             <a:endParaRPr lang="en-US" dirty="0"/>
           </a:p>
         </p:txBody>
@@ -10850,7 +11391,7 @@
           <p:cNvPr id="4" name="Slide Number Placeholder 3">
             <a:extLst>
               <a:ext uri="{FF2B5EF4-FFF2-40B4-BE49-F238E27FC236}">
-                <a16:creationId xmlns:a16="http://schemas.microsoft.com/office/drawing/2014/main" id="{66441BF3-B319-4719-9933-B7B7F3244E64}"/>
+                <a16:creationId xmlns:a16="http://schemas.microsoft.com/office/drawing/2014/main" id="{B061B1C6-5E6F-4408-9C79-8B3E2C5DE989}"/>
               </a:ext>
             </a:extLst>
           </p:cNvPr>
@@ -10866,8 +11407,14 @@
           <a:bodyPr/>
           <a:lstStyle/>
           <a:p>
-            <a:fld id="{20F37917-FD3A-4669-9018-DA04BCDD3D75}" type="slidenum">
+            <a:pPr defTabSz="547695">
+              <a:defRPr/>
+            </a:pPr>
+            <a:fld id="{86CB4B4D-7CA3-9044-876B-883B54F8677D}" type="slidenum">
               <a:rPr lang="en-US" smtClean="0"/>
+              <a:pPr defTabSz="547695">
+                <a:defRPr/>
+              </a:pPr>
               <a:t>21</a:t>
             </a:fld>
             <a:endParaRPr lang="en-US"/>
@@ -10877,7 +11424,7 @@
     </p:spTree>
     <p:extLst>
       <p:ext uri="{BB962C8B-B14F-4D97-AF65-F5344CB8AC3E}">
-        <p14:creationId xmlns:p14="http://schemas.microsoft.com/office/powerpoint/2010/main" val="2855917600"/>
+        <p14:creationId xmlns:p14="http://schemas.microsoft.com/office/powerpoint/2010/main" val="1665633817"/>
       </p:ext>
     </p:extLst>
   </p:cSld>
@@ -10909,7 +11456,7 @@
           <p:cNvPr id="2" name="Title 1">
             <a:extLst>
               <a:ext uri="{FF2B5EF4-FFF2-40B4-BE49-F238E27FC236}">
-                <a16:creationId xmlns:a16="http://schemas.microsoft.com/office/drawing/2014/main" id="{ADDDF7AD-1809-4173-85DB-C6679D1D1171}"/>
+                <a16:creationId xmlns:a16="http://schemas.microsoft.com/office/drawing/2014/main" id="{1DD99648-CE8F-4E19-953E-8B3920440319}"/>
               </a:ext>
             </a:extLst>
           </p:cNvPr>
@@ -10927,17 +11474,17 @@
           <a:p>
             <a:r>
               <a:rPr lang="en-US" dirty="0"/>
-              <a:t>Review</a:t>
-            </a:r>
-          </a:p>
-        </p:txBody>
-      </p:sp>
-      <p:sp>
-        <p:nvSpPr>
-          <p:cNvPr id="3" name="Text Placeholder 2">
+              <a:t>Communication</a:t>
+            </a:r>
+          </a:p>
+        </p:txBody>
+      </p:sp>
+      <p:sp>
+        <p:nvSpPr>
+          <p:cNvPr id="3" name="Content Placeholder 2">
             <a:extLst>
               <a:ext uri="{FF2B5EF4-FFF2-40B4-BE49-F238E27FC236}">
-                <a16:creationId xmlns:a16="http://schemas.microsoft.com/office/drawing/2014/main" id="{2DC04701-46F5-4631-A66B-9AC1D5520E14}"/>
+                <a16:creationId xmlns:a16="http://schemas.microsoft.com/office/drawing/2014/main" id="{82CC43D4-82B4-449F-8A4A-151724B1D9F3}"/>
               </a:ext>
             </a:extLst>
           </p:cNvPr>
@@ -10948,38 +11495,70 @@
             <p:ph idx="1"/>
           </p:nvPr>
         </p:nvSpPr>
-        <p:spPr/>
-        <p:txBody>
-          <a:bodyPr/>
+        <p:spPr>
+          <a:xfrm>
+            <a:off x="838199" y="1500160"/>
+            <a:ext cx="10515599" cy="4351338"/>
+          </a:xfrm>
+        </p:spPr>
+        <p:txBody>
+          <a:bodyPr>
+            <a:normAutofit/>
+          </a:bodyPr>
           <a:lstStyle/>
           <a:p>
             <a:r>
               <a:rPr lang="en-US" dirty="0"/>
-              <a:t>Now that you've studied this lesson, you should be able to:</a:t>
+              <a:t>Canvas</a:t>
+            </a:r>
+          </a:p>
+          <a:p>
+            <a:r>
+              <a:rPr lang="en-US" dirty="0"/>
+              <a:t>Course web page (</a:t>
+            </a:r>
+            <a:r>
+              <a:rPr lang="en-US" dirty="0">
+                <a:hlinkClick r:id="rId2"/>
+              </a:rPr>
+              <a:t>https://neu-se.github.io/CS4530-Spring-2023</a:t>
+            </a:r>
+            <a:r>
+              <a:rPr lang="en-US" dirty="0"/>
+              <a:t>)</a:t>
             </a:r>
           </a:p>
           <a:p>
             <a:pPr lvl="1"/>
             <a:r>
               <a:rPr lang="en-US" dirty="0"/>
-              <a:t>Explain in general terms what software engineering is </a:t>
+              <a:t>Canvas and the course web site will mirror each other.</a:t>
             </a:r>
           </a:p>
           <a:p>
             <a:pPr lvl="1"/>
             <a:r>
               <a:rPr lang="en-US" dirty="0"/>
-              <a:t>List your weekly obligations as a student</a:t>
+              <a:t>Assignments, important notices, etc., will appear in both places.</a:t>
+            </a:r>
+          </a:p>
+          <a:p>
+            <a:r>
+              <a:rPr lang="en-US" dirty="0"/>
+              <a:t>Piazza (see Canvas for link)</a:t>
             </a:r>
           </a:p>
           <a:p>
             <a:pPr lvl="1"/>
             <a:r>
               <a:rPr lang="en-US" dirty="0"/>
-              <a:t>List the requirements for completing the course</a:t>
-            </a:r>
-          </a:p>
-          <a:p>
+              <a:t>for questions about assignments, projects, etc.</a:t>
+            </a:r>
+          </a:p>
+          <a:p>
+            <a:pPr marL="0" indent="0">
+              <a:buNone/>
+            </a:pPr>
             <a:endParaRPr lang="en-US" dirty="0"/>
           </a:p>
         </p:txBody>
@@ -10989,7 +11568,7 @@
           <p:cNvPr id="4" name="Slide Number Placeholder 3">
             <a:extLst>
               <a:ext uri="{FF2B5EF4-FFF2-40B4-BE49-F238E27FC236}">
-                <a16:creationId xmlns:a16="http://schemas.microsoft.com/office/drawing/2014/main" id="{9A834773-9D4D-43DB-BE71-9B7317CC3980}"/>
+                <a16:creationId xmlns:a16="http://schemas.microsoft.com/office/drawing/2014/main" id="{66441BF3-B319-4719-9933-B7B7F3244E64}"/>
               </a:ext>
             </a:extLst>
           </p:cNvPr>
@@ -11005,14 +11584,8 @@
           <a:bodyPr/>
           <a:lstStyle/>
           <a:p>
-            <a:pPr defTabSz="547695">
-              <a:defRPr/>
-            </a:pPr>
-            <a:fld id="{86CB4B4D-7CA3-9044-876B-883B54F8677D}" type="slidenum">
+            <a:fld id="{20F37917-FD3A-4669-9018-DA04BCDD3D75}" type="slidenum">
               <a:rPr lang="en-US" smtClean="0"/>
-              <a:pPr defTabSz="547695">
-                <a:defRPr/>
-              </a:pPr>
               <a:t>22</a:t>
             </a:fld>
             <a:endParaRPr lang="en-US"/>
@@ -11022,7 +11595,7 @@
     </p:spTree>
     <p:extLst>
       <p:ext uri="{BB962C8B-B14F-4D97-AF65-F5344CB8AC3E}">
-        <p14:creationId xmlns:p14="http://schemas.microsoft.com/office/powerpoint/2010/main" val="2798469173"/>
+        <p14:creationId xmlns:p14="http://schemas.microsoft.com/office/powerpoint/2010/main" val="2855917600"/>
       </p:ext>
     </p:extLst>
   </p:cSld>
@@ -11054,6 +11627,151 @@
           <p:cNvPr id="2" name="Title 1">
             <a:extLst>
               <a:ext uri="{FF2B5EF4-FFF2-40B4-BE49-F238E27FC236}">
+                <a16:creationId xmlns:a16="http://schemas.microsoft.com/office/drawing/2014/main" id="{ADDDF7AD-1809-4173-85DB-C6679D1D1171}"/>
+              </a:ext>
+            </a:extLst>
+          </p:cNvPr>
+          <p:cNvSpPr>
+            <a:spLocks noGrp="1"/>
+          </p:cNvSpPr>
+          <p:nvPr>
+            <p:ph type="title"/>
+          </p:nvPr>
+        </p:nvSpPr>
+        <p:spPr/>
+        <p:txBody>
+          <a:bodyPr/>
+          <a:lstStyle/>
+          <a:p>
+            <a:r>
+              <a:rPr lang="en-US" dirty="0"/>
+              <a:t>Review</a:t>
+            </a:r>
+          </a:p>
+        </p:txBody>
+      </p:sp>
+      <p:sp>
+        <p:nvSpPr>
+          <p:cNvPr id="3" name="Text Placeholder 2">
+            <a:extLst>
+              <a:ext uri="{FF2B5EF4-FFF2-40B4-BE49-F238E27FC236}">
+                <a16:creationId xmlns:a16="http://schemas.microsoft.com/office/drawing/2014/main" id="{2DC04701-46F5-4631-A66B-9AC1D5520E14}"/>
+              </a:ext>
+            </a:extLst>
+          </p:cNvPr>
+          <p:cNvSpPr>
+            <a:spLocks noGrp="1"/>
+          </p:cNvSpPr>
+          <p:nvPr>
+            <p:ph idx="1"/>
+          </p:nvPr>
+        </p:nvSpPr>
+        <p:spPr/>
+        <p:txBody>
+          <a:bodyPr/>
+          <a:lstStyle/>
+          <a:p>
+            <a:r>
+              <a:rPr lang="en-US" dirty="0"/>
+              <a:t>Now that you've studied this lesson, you should be able to:</a:t>
+            </a:r>
+          </a:p>
+          <a:p>
+            <a:pPr lvl="1"/>
+            <a:r>
+              <a:rPr lang="en-US" dirty="0"/>
+              <a:t>Explain in general terms what software engineering is </a:t>
+            </a:r>
+          </a:p>
+          <a:p>
+            <a:pPr lvl="1"/>
+            <a:r>
+              <a:rPr lang="en-US" dirty="0"/>
+              <a:t>List your weekly obligations as a student</a:t>
+            </a:r>
+          </a:p>
+          <a:p>
+            <a:pPr lvl="1"/>
+            <a:r>
+              <a:rPr lang="en-US" dirty="0"/>
+              <a:t>List the requirements for completing the course</a:t>
+            </a:r>
+          </a:p>
+          <a:p>
+            <a:endParaRPr lang="en-US" dirty="0"/>
+          </a:p>
+        </p:txBody>
+      </p:sp>
+      <p:sp>
+        <p:nvSpPr>
+          <p:cNvPr id="4" name="Slide Number Placeholder 3">
+            <a:extLst>
+              <a:ext uri="{FF2B5EF4-FFF2-40B4-BE49-F238E27FC236}">
+                <a16:creationId xmlns:a16="http://schemas.microsoft.com/office/drawing/2014/main" id="{9A834773-9D4D-43DB-BE71-9B7317CC3980}"/>
+              </a:ext>
+            </a:extLst>
+          </p:cNvPr>
+          <p:cNvSpPr>
+            <a:spLocks noGrp="1"/>
+          </p:cNvSpPr>
+          <p:nvPr>
+            <p:ph type="sldNum" sz="quarter" idx="12"/>
+          </p:nvPr>
+        </p:nvSpPr>
+        <p:spPr/>
+        <p:txBody>
+          <a:bodyPr/>
+          <a:lstStyle/>
+          <a:p>
+            <a:pPr defTabSz="547695">
+              <a:defRPr/>
+            </a:pPr>
+            <a:fld id="{86CB4B4D-7CA3-9044-876B-883B54F8677D}" type="slidenum">
+              <a:rPr lang="en-US" smtClean="0"/>
+              <a:pPr defTabSz="547695">
+                <a:defRPr/>
+              </a:pPr>
+              <a:t>23</a:t>
+            </a:fld>
+            <a:endParaRPr lang="en-US"/>
+          </a:p>
+        </p:txBody>
+      </p:sp>
+    </p:spTree>
+    <p:extLst>
+      <p:ext uri="{BB962C8B-B14F-4D97-AF65-F5344CB8AC3E}">
+        <p14:creationId xmlns:p14="http://schemas.microsoft.com/office/powerpoint/2010/main" val="2798469173"/>
+      </p:ext>
+    </p:extLst>
+  </p:cSld>
+  <p:clrMapOvr>
+    <a:masterClrMapping/>
+  </p:clrMapOvr>
+</p:sld>
+</file>
+
+<file path=ppt/slides/slide24.xml><?xml version="1.0" encoding="utf-8"?>
+<p:sld xmlns:a="http://schemas.openxmlformats.org/drawingml/2006/main" xmlns:r="http://schemas.openxmlformats.org/officeDocument/2006/relationships" xmlns:p="http://schemas.openxmlformats.org/presentationml/2006/main">
+  <p:cSld>
+    <p:spTree>
+      <p:nvGrpSpPr>
+        <p:cNvPr id="1" name=""/>
+        <p:cNvGrpSpPr/>
+        <p:nvPr/>
+      </p:nvGrpSpPr>
+      <p:grpSpPr>
+        <a:xfrm>
+          <a:off x="0" y="0"/>
+          <a:ext cx="0" cy="0"/>
+          <a:chOff x="0" y="0"/>
+          <a:chExt cx="0" cy="0"/>
+        </a:xfrm>
+      </p:grpSpPr>
+      <p:sp>
+        <p:nvSpPr>
+          <p:cNvPr id="2" name="Title 1">
+            <a:extLst>
+              <a:ext uri="{FF2B5EF4-FFF2-40B4-BE49-F238E27FC236}">
                 <a16:creationId xmlns:a16="http://schemas.microsoft.com/office/drawing/2014/main" id="{4F8F7B5D-FB6C-436E-B15E-6071C1AF4E43}"/>
               </a:ext>
             </a:extLst>
@@ -11169,7 +11887,7 @@
           <a:p>
             <a:fld id="{20F37917-FD3A-4669-9018-DA04BCDD3D75}" type="slidenum">
               <a:rPr lang="en-US" smtClean="0"/>
-              <a:t>23</a:t>
+              <a:t>24</a:t>
             </a:fld>
             <a:endParaRPr lang="en-US"/>
           </a:p>
@@ -13089,7 +13807,7 @@
           </a:ln>
           <a:extLst>
             <a:ext uri="{C572A759-6A51-4108-AA02-DFA0A04FC94B}">
-              <ma14:wrappingTextBoxFlag xmlns="" xmlns:m="http://schemas.openxmlformats.org/officeDocument/2006/math" xmlns:a14="http://schemas.microsoft.com/office/drawing/2010/main" xmlns:ma14="http://schemas.microsoft.com/office/mac/drawingml/2011/main" val="1"/>
+              <ma14:wrappingTextBoxFlag xmlns:ma14="http://schemas.microsoft.com/office/mac/drawingml/2011/main" xmlns:a14="http://schemas.microsoft.com/office/drawing/2010/main" xmlns:m="http://schemas.openxmlformats.org/officeDocument/2006/math" xmlns="" val="1"/>
             </a:ext>
           </a:extLst>
         </p:spPr>
@@ -13150,7 +13868,7 @@
           </a:ln>
           <a:extLst>
             <a:ext uri="{C572A759-6A51-4108-AA02-DFA0A04FC94B}">
-              <ma14:wrappingTextBoxFlag xmlns="" xmlns:m="http://schemas.openxmlformats.org/officeDocument/2006/math" xmlns:a14="http://schemas.microsoft.com/office/drawing/2010/main" xmlns:ma14="http://schemas.microsoft.com/office/mac/drawingml/2011/main" val="1"/>
+              <ma14:wrappingTextBoxFlag xmlns:ma14="http://schemas.microsoft.com/office/mac/drawingml/2011/main" xmlns:a14="http://schemas.microsoft.com/office/drawing/2010/main" xmlns:m="http://schemas.openxmlformats.org/officeDocument/2006/math" xmlns="" val="1"/>
             </a:ext>
           </a:extLst>
         </p:spPr>

</xml_diff>

<commit_message>
added updates from mitch
</commit_message>
<xml_diff>
--- a/Slides/Module 01.1 Course Introduction.pptx
+++ b/Slides/Module 01.1 Course Introduction.pptx
@@ -3667,7 +3667,7 @@
           <a:p>
             <a:fld id="{7C7E5181-6CF5-45F7-A87A-E0E0B1FD7549}" type="datetimeFigureOut">
               <a:rPr lang="en-US" smtClean="0"/>
-              <a:t>12/19/2022</a:t>
+              <a:t>12/25/2022</a:t>
             </a:fld>
             <a:endParaRPr lang="en-US"/>
           </a:p>
@@ -3978,7 +3978,10 @@
           <a:bodyPr/>
           <a:lstStyle/>
           <a:p>
-            <a:endParaRPr lang="en-US" dirty="0"/>
+            <a:r>
+              <a:rPr lang="en-US" dirty="0"/>
+              <a:t>Software engineering refers to study of all aspects of software development …. It is an attempt to apply a typical engineering “process” to building of software. The word cloud shows everything that’s typically part of SE. We will highlight the approaches that {hopefully} scale well.</a:t>
+            </a:r>
           </a:p>
         </p:txBody>
       </p:sp>
@@ -4062,7 +4065,10 @@
           <a:bodyPr/>
           <a:lstStyle/>
           <a:p>
-            <a:endParaRPr lang="en-US" dirty="0"/>
+            <a:r>
+              <a:rPr lang="en-US" dirty="0"/>
+              <a:t>We will look over all aspects of SDLC and our focus will be on TDD. There are several different SDLCs that have been proposed over the last half a century. </a:t>
+            </a:r>
           </a:p>
         </p:txBody>
       </p:sp>
@@ -4121,7 +4127,7 @@
       </p:grpSpPr>
       <p:sp>
         <p:nvSpPr>
-          <p:cNvPr id="206" name="Shape 206"/>
+          <p:cNvPr id="2" name="Slide Image Placeholder 1"/>
           <p:cNvSpPr>
             <a:spLocks noGrp="1" noRot="1" noChangeAspect="1"/>
           </p:cNvSpPr>
@@ -4129,47 +4135,59 @@
             <p:ph type="sldImg"/>
           </p:nvPr>
         </p:nvSpPr>
-        <p:spPr>
-          <a:xfrm>
-            <a:off x="325438" y="698500"/>
-            <a:ext cx="6207125" cy="3492500"/>
-          </a:xfrm>
-          <a:prstGeom prst="rect">
-            <a:avLst/>
-          </a:prstGeom>
-        </p:spPr>
+        <p:spPr/>
+      </p:sp>
+      <p:sp>
+        <p:nvSpPr>
+          <p:cNvPr id="3" name="Notes Placeholder 2"/>
+          <p:cNvSpPr>
+            <a:spLocks noGrp="1"/>
+          </p:cNvSpPr>
+          <p:nvPr>
+            <p:ph type="body" idx="1"/>
+          </p:nvPr>
+        </p:nvSpPr>
+        <p:spPr/>
         <p:txBody>
           <a:bodyPr/>
           <a:lstStyle/>
           <a:p>
-            <a:endParaRPr/>
-          </a:p>
-        </p:txBody>
-      </p:sp>
-      <p:sp>
-        <p:nvSpPr>
-          <p:cNvPr id="207" name="Shape 207"/>
-          <p:cNvSpPr>
-            <a:spLocks noGrp="1"/>
-          </p:cNvSpPr>
-          <p:nvPr>
-            <p:ph type="body" sz="quarter" idx="1"/>
-          </p:nvPr>
-        </p:nvSpPr>
-        <p:spPr>
-          <a:prstGeom prst="rect">
-            <a:avLst/>
-          </a:prstGeom>
-        </p:spPr>
+            <a:r>
+              <a:rPr lang="en-US" dirty="0"/>
+              <a:t>How are they different? Which one should you use? The answer is: it depends ….</a:t>
+            </a:r>
+          </a:p>
+        </p:txBody>
+      </p:sp>
+      <p:sp>
+        <p:nvSpPr>
+          <p:cNvPr id="4" name="Slide Number Placeholder 3"/>
+          <p:cNvSpPr>
+            <a:spLocks noGrp="1"/>
+          </p:cNvSpPr>
+          <p:nvPr>
+            <p:ph type="sldNum" sz="quarter" idx="5"/>
+          </p:nvPr>
+        </p:nvSpPr>
+        <p:spPr/>
         <p:txBody>
           <a:bodyPr/>
           <a:lstStyle/>
           <a:p>
-            <a:endParaRPr dirty="0"/>
+            <a:fld id="{07937F07-1250-4CCE-B198-1B2887014F41}" type="slidenum">
+              <a:rPr lang="en-US" smtClean="0"/>
+              <a:t>7</a:t>
+            </a:fld>
+            <a:endParaRPr lang="en-US"/>
           </a:p>
         </p:txBody>
       </p:sp>
     </p:spTree>
+    <p:extLst>
+      <p:ext uri="{BB962C8B-B14F-4D97-AF65-F5344CB8AC3E}">
+        <p14:creationId xmlns:p14="http://schemas.microsoft.com/office/powerpoint/2010/main" val="848543051"/>
+      </p:ext>
+    </p:extLst>
   </p:cSld>
   <p:clrMapOvr>
     <a:masterClrMapping/>
@@ -4196,7 +4214,7 @@
       </p:grpSpPr>
       <p:sp>
         <p:nvSpPr>
-          <p:cNvPr id="2" name="Slide Image Placeholder 1"/>
+          <p:cNvPr id="206" name="Shape 206"/>
           <p:cNvSpPr>
             <a:spLocks noGrp="1" noRot="1" noChangeAspect="1"/>
           </p:cNvSpPr>
@@ -4204,146 +4222,47 @@
             <p:ph type="sldImg"/>
           </p:nvPr>
         </p:nvSpPr>
-        <p:spPr/>
-      </p:sp>
-      <p:sp>
-        <p:nvSpPr>
-          <p:cNvPr id="3" name="Notes Placeholder 2"/>
-          <p:cNvSpPr>
-            <a:spLocks noGrp="1"/>
-          </p:cNvSpPr>
-          <p:nvPr>
-            <p:ph type="body" idx="1"/>
-          </p:nvPr>
-        </p:nvSpPr>
-        <p:spPr/>
+        <p:spPr>
+          <a:xfrm>
+            <a:off x="325438" y="698500"/>
+            <a:ext cx="6207125" cy="3492500"/>
+          </a:xfrm>
+          <a:prstGeom prst="rect">
+            <a:avLst/>
+          </a:prstGeom>
+        </p:spPr>
         <p:txBody>
           <a:bodyPr/>
           <a:lstStyle/>
           <a:p>
-            <a:r>
-              <a:rPr lang="en-US" b="0" i="0" dirty="0" err="1">
-                <a:solidFill>
-                  <a:srgbClr val="2D3B45"/>
-                </a:solidFill>
-                <a:effectLst/>
-                <a:latin typeface="Lato Extended"/>
-              </a:rPr>
-              <a:t>Covey.Town</a:t>
-            </a:r>
-            <a:r>
-              <a:rPr lang="en-US" b="0" i="0" dirty="0">
-                <a:solidFill>
-                  <a:srgbClr val="2D3B45"/>
-                </a:solidFill>
-                <a:effectLst/>
-                <a:latin typeface="Lato Extended"/>
-              </a:rPr>
-              <a:t> provides a virtual meeting space where different groups of people can have simultaneous video calls, allowing participants to drift between different conversations, just like in real life. </a:t>
-            </a:r>
-            <a:r>
-              <a:rPr lang="en-US" b="0" i="0" dirty="0" err="1">
-                <a:solidFill>
-                  <a:srgbClr val="2D3B45"/>
-                </a:solidFill>
-                <a:effectLst/>
-                <a:latin typeface="Lato Extended"/>
-              </a:rPr>
-              <a:t>Covey.Town</a:t>
-            </a:r>
-            <a:r>
-              <a:rPr lang="en-US" b="0" i="0" dirty="0">
-                <a:solidFill>
-                  <a:srgbClr val="2D3B45"/>
-                </a:solidFill>
-                <a:effectLst/>
-                <a:latin typeface="Lato Extended"/>
-              </a:rPr>
-              <a:t> is inspired by existing products like </a:t>
-            </a:r>
-            <a:r>
-              <a:rPr lang="en-US" b="0" i="0" u="sng" dirty="0" err="1">
-                <a:effectLst/>
-                <a:latin typeface="Lato Extended"/>
-              </a:rPr>
-              <a:t>Gather.Town</a:t>
-            </a:r>
-            <a:r>
-              <a:rPr lang="en-US" b="0" i="0" u="sng" dirty="0">
-                <a:effectLst/>
-                <a:latin typeface="Lato Extended"/>
-              </a:rPr>
-              <a:t> , </a:t>
-            </a:r>
-            <a:r>
-              <a:rPr lang="en-US" b="0" i="0" u="sng" dirty="0" err="1">
-                <a:effectLst/>
-                <a:latin typeface="Lato Extended"/>
-                <a:hlinkClick r:id="rId3"/>
-              </a:rPr>
-              <a:t>Sococo</a:t>
-            </a:r>
-            <a:r>
-              <a:rPr lang="en-US" b="0" i="0" dirty="0">
-                <a:solidFill>
-                  <a:srgbClr val="2D3B45"/>
-                </a:solidFill>
-                <a:effectLst/>
-                <a:latin typeface="Lato Extended"/>
-              </a:rPr>
-              <a:t>, and </a:t>
-            </a:r>
-            <a:r>
-              <a:rPr lang="en-US" b="0" i="0" u="sng" dirty="0">
-                <a:effectLst/>
-                <a:latin typeface="Lato Extended"/>
-                <a:hlinkClick r:id="rId4"/>
-              </a:rPr>
-              <a:t>Gatherly.IO</a:t>
-            </a:r>
-            <a:r>
-              <a:rPr lang="en-US" b="0" i="0" dirty="0">
-                <a:solidFill>
-                  <a:srgbClr val="2D3B45"/>
-                </a:solidFill>
-                <a:effectLst/>
-                <a:latin typeface="Lato Extended"/>
-              </a:rPr>
-              <a:t>— but it is an open source effort, and the features will be proposed and implemented by you! All implementation will take place in the TypeScript programming language, using React for the user interface.</a:t>
-            </a:r>
-            <a:endParaRPr lang="en-US" dirty="0"/>
-          </a:p>
-        </p:txBody>
-      </p:sp>
-      <p:sp>
-        <p:nvSpPr>
-          <p:cNvPr id="4" name="Slide Number Placeholder 3"/>
-          <p:cNvSpPr>
-            <a:spLocks noGrp="1"/>
-          </p:cNvSpPr>
-          <p:nvPr>
-            <p:ph type="sldNum" sz="quarter" idx="5"/>
-          </p:nvPr>
-        </p:nvSpPr>
-        <p:spPr/>
+            <a:endParaRPr/>
+          </a:p>
+        </p:txBody>
+      </p:sp>
+      <p:sp>
+        <p:nvSpPr>
+          <p:cNvPr id="207" name="Shape 207"/>
+          <p:cNvSpPr>
+            <a:spLocks noGrp="1"/>
+          </p:cNvSpPr>
+          <p:nvPr>
+            <p:ph type="body" sz="quarter" idx="1"/>
+          </p:nvPr>
+        </p:nvSpPr>
+        <p:spPr>
+          <a:prstGeom prst="rect">
+            <a:avLst/>
+          </a:prstGeom>
+        </p:spPr>
         <p:txBody>
           <a:bodyPr/>
           <a:lstStyle/>
           <a:p>
-            <a:fld id="{07937F07-1250-4CCE-B198-1B2887014F41}" type="slidenum">
-              <a:rPr lang="en-US" smtClean="0"/>
-              <a:t>16</a:t>
-            </a:fld>
-            <a:endParaRPr lang="en-US"/>
+            <a:endParaRPr dirty="0"/>
           </a:p>
         </p:txBody>
       </p:sp>
     </p:spTree>
-    <p:extLst>
-      <p:ext uri="{BB962C8B-B14F-4D97-AF65-F5344CB8AC3E}">
-        <p14:creationId xmlns:p14="http://schemas.microsoft.com/office/powerpoint/2010/main" val="875248814"/>
-      </p:ext>
-    </p:extLst>
   </p:cSld>
   <p:clrMapOvr>
     <a:masterClrMapping/>
@@ -4395,6 +4314,96 @@
           <a:bodyPr/>
           <a:lstStyle/>
           <a:p>
+            <a:r>
+              <a:rPr lang="en-US" b="0" i="0" dirty="0" err="1">
+                <a:solidFill>
+                  <a:srgbClr val="2D3B45"/>
+                </a:solidFill>
+                <a:effectLst/>
+                <a:latin typeface="Lato Extended"/>
+              </a:rPr>
+              <a:t>Covey.Town</a:t>
+            </a:r>
+            <a:r>
+              <a:rPr lang="en-US" b="0" i="0" dirty="0">
+                <a:solidFill>
+                  <a:srgbClr val="2D3B45"/>
+                </a:solidFill>
+                <a:effectLst/>
+                <a:latin typeface="Lato Extended"/>
+              </a:rPr>
+              <a:t> provides a virtual meeting space where different groups of people can have simultaneous video calls, allowing participants to drift between different conversations, just like in real life. </a:t>
+            </a:r>
+            <a:r>
+              <a:rPr lang="en-US" b="0" i="0" dirty="0" err="1">
+                <a:solidFill>
+                  <a:srgbClr val="2D3B45"/>
+                </a:solidFill>
+                <a:effectLst/>
+                <a:latin typeface="Lato Extended"/>
+              </a:rPr>
+              <a:t>Covey.Town</a:t>
+            </a:r>
+            <a:r>
+              <a:rPr lang="en-US" b="0" i="0" dirty="0">
+                <a:solidFill>
+                  <a:srgbClr val="2D3B45"/>
+                </a:solidFill>
+                <a:effectLst/>
+                <a:latin typeface="Lato Extended"/>
+              </a:rPr>
+              <a:t> is inspired by existing products like </a:t>
+            </a:r>
+            <a:r>
+              <a:rPr lang="en-US" b="0" i="0" u="sng" dirty="0" err="1">
+                <a:effectLst/>
+                <a:latin typeface="Lato Extended"/>
+              </a:rPr>
+              <a:t>Gather.Town</a:t>
+            </a:r>
+            <a:r>
+              <a:rPr lang="en-US" b="0" i="0" u="sng" dirty="0">
+                <a:effectLst/>
+                <a:latin typeface="Lato Extended"/>
+              </a:rPr>
+              <a:t> , </a:t>
+            </a:r>
+            <a:r>
+              <a:rPr lang="en-US" b="0" i="0" u="sng" dirty="0" err="1">
+                <a:effectLst/>
+                <a:latin typeface="Lato Extended"/>
+                <a:hlinkClick r:id="rId3"/>
+              </a:rPr>
+              <a:t>Sococo</a:t>
+            </a:r>
+            <a:r>
+              <a:rPr lang="en-US" b="0" i="0" dirty="0">
+                <a:solidFill>
+                  <a:srgbClr val="2D3B45"/>
+                </a:solidFill>
+                <a:effectLst/>
+                <a:latin typeface="Lato Extended"/>
+              </a:rPr>
+              <a:t>, and </a:t>
+            </a:r>
+            <a:r>
+              <a:rPr lang="en-US" b="0" i="0" u="sng" dirty="0">
+                <a:effectLst/>
+                <a:latin typeface="Lato Extended"/>
+                <a:hlinkClick r:id="rId4"/>
+              </a:rPr>
+              <a:t>Gatherly.IO</a:t>
+            </a:r>
+            <a:r>
+              <a:rPr lang="en-US" b="0" i="0" dirty="0">
+                <a:solidFill>
+                  <a:srgbClr val="2D3B45"/>
+                </a:solidFill>
+                <a:effectLst/>
+                <a:latin typeface="Lato Extended"/>
+              </a:rPr>
+              <a:t>— but it is an open source effort, and the features will be proposed and implemented by you! All implementation will take place in the TypeScript programming language, using React for the user interface.</a:t>
+            </a:r>
             <a:endParaRPr lang="en-US" dirty="0"/>
           </a:p>
         </p:txBody>
@@ -4416,7 +4425,7 @@
           <a:p>
             <a:fld id="{07937F07-1250-4CCE-B198-1B2887014F41}" type="slidenum">
               <a:rPr lang="en-US" smtClean="0"/>
-              <a:t>17</a:t>
+              <a:t>16</a:t>
             </a:fld>
             <a:endParaRPr lang="en-US"/>
           </a:p>
@@ -4425,7 +4434,7 @@
     </p:spTree>
     <p:extLst>
       <p:ext uri="{BB962C8B-B14F-4D97-AF65-F5344CB8AC3E}">
-        <p14:creationId xmlns:p14="http://schemas.microsoft.com/office/powerpoint/2010/main" val="1260796881"/>
+        <p14:creationId xmlns:p14="http://schemas.microsoft.com/office/powerpoint/2010/main" val="875248814"/>
       </p:ext>
     </p:extLst>
   </p:cSld>
@@ -4462,6 +4471,90 @@
             <p:ph type="sldImg"/>
           </p:nvPr>
         </p:nvSpPr>
+        <p:spPr/>
+      </p:sp>
+      <p:sp>
+        <p:nvSpPr>
+          <p:cNvPr id="3" name="Notes Placeholder 2"/>
+          <p:cNvSpPr>
+            <a:spLocks noGrp="1"/>
+          </p:cNvSpPr>
+          <p:nvPr>
+            <p:ph type="body" idx="1"/>
+          </p:nvPr>
+        </p:nvSpPr>
+        <p:spPr/>
+        <p:txBody>
+          <a:bodyPr/>
+          <a:lstStyle/>
+          <a:p>
+            <a:endParaRPr lang="en-US" dirty="0"/>
+          </a:p>
+        </p:txBody>
+      </p:sp>
+      <p:sp>
+        <p:nvSpPr>
+          <p:cNvPr id="4" name="Slide Number Placeholder 3"/>
+          <p:cNvSpPr>
+            <a:spLocks noGrp="1"/>
+          </p:cNvSpPr>
+          <p:nvPr>
+            <p:ph type="sldNum" sz="quarter" idx="5"/>
+          </p:nvPr>
+        </p:nvSpPr>
+        <p:spPr/>
+        <p:txBody>
+          <a:bodyPr/>
+          <a:lstStyle/>
+          <a:p>
+            <a:fld id="{07937F07-1250-4CCE-B198-1B2887014F41}" type="slidenum">
+              <a:rPr lang="en-US" smtClean="0"/>
+              <a:t>17</a:t>
+            </a:fld>
+            <a:endParaRPr lang="en-US"/>
+          </a:p>
+        </p:txBody>
+      </p:sp>
+    </p:spTree>
+    <p:extLst>
+      <p:ext uri="{BB962C8B-B14F-4D97-AF65-F5344CB8AC3E}">
+        <p14:creationId xmlns:p14="http://schemas.microsoft.com/office/powerpoint/2010/main" val="1260796881"/>
+      </p:ext>
+    </p:extLst>
+  </p:cSld>
+  <p:clrMapOvr>
+    <a:masterClrMapping/>
+  </p:clrMapOvr>
+</p:notes>
+</file>
+
+<file path=ppt/notesSlides/notesSlide7.xml><?xml version="1.0" encoding="utf-8"?>
+<p:notes xmlns:a="http://schemas.openxmlformats.org/drawingml/2006/main" xmlns:r="http://schemas.openxmlformats.org/officeDocument/2006/relationships" xmlns:p="http://schemas.openxmlformats.org/presentationml/2006/main">
+  <p:cSld>
+    <p:spTree>
+      <p:nvGrpSpPr>
+        <p:cNvPr id="1" name=""/>
+        <p:cNvGrpSpPr/>
+        <p:nvPr/>
+      </p:nvGrpSpPr>
+      <p:grpSpPr>
+        <a:xfrm>
+          <a:off x="0" y="0"/>
+          <a:ext cx="0" cy="0"/>
+          <a:chOff x="0" y="0"/>
+          <a:chExt cx="0" cy="0"/>
+        </a:xfrm>
+      </p:grpSpPr>
+      <p:sp>
+        <p:nvSpPr>
+          <p:cNvPr id="2" name="Slide Image Placeholder 1"/>
+          <p:cNvSpPr>
+            <a:spLocks noGrp="1" noRot="1" noChangeAspect="1"/>
+          </p:cNvSpPr>
+          <p:nvPr>
+            <p:ph type="sldImg"/>
+          </p:nvPr>
+        </p:nvSpPr>
         <p:spPr>
           <a:xfrm>
             <a:off x="325438" y="698500"/>
@@ -4501,7 +4594,7 @@
 </p:notes>
 </file>
 
-<file path=ppt/notesSlides/notesSlide7.xml><?xml version="1.0" encoding="utf-8"?>
+<file path=ppt/notesSlides/notesSlide8.xml><?xml version="1.0" encoding="utf-8"?>
 <p:notes xmlns:a="http://schemas.openxmlformats.org/drawingml/2006/main" xmlns:r="http://schemas.openxmlformats.org/officeDocument/2006/relationships" xmlns:p="http://schemas.openxmlformats.org/presentationml/2006/main">
   <p:cSld>
     <p:spTree>
@@ -4747,7 +4840,7 @@
           <a:p>
             <a:fld id="{5D2A64DE-480B-420F-9649-4F8E696E08E0}" type="datetime1">
               <a:rPr lang="en-US" smtClean="0"/>
-              <a:t>12/19/2022</a:t>
+              <a:t>12/25/2022</a:t>
             </a:fld>
             <a:endParaRPr lang="en-US"/>
           </a:p>
@@ -4981,7 +5074,7 @@
           <a:p>
             <a:fld id="{0D3616D0-8311-4107-9726-6B805E7D05BA}" type="datetime1">
               <a:rPr lang="en-US" smtClean="0"/>
-              <a:t>12/19/2022</a:t>
+              <a:t>12/25/2022</a:t>
             </a:fld>
             <a:endParaRPr lang="en-US"/>
           </a:p>
@@ -5189,7 +5282,7 @@
           <a:p>
             <a:fld id="{3BC2557A-5C88-417A-A763-5AC779462A5F}" type="datetime1">
               <a:rPr lang="en-US" smtClean="0"/>
-              <a:t>12/19/2022</a:t>
+              <a:t>12/25/2022</a:t>
             </a:fld>
             <a:endParaRPr lang="en-US"/>
           </a:p>
@@ -5713,7 +5806,7 @@
           <a:p>
             <a:fld id="{07C7BFD4-467E-4EDE-93EA-052F5B39A4E5}" type="datetime1">
               <a:rPr lang="en-US" smtClean="0"/>
-              <a:t>12/19/2022</a:t>
+              <a:t>12/25/2022</a:t>
             </a:fld>
             <a:endParaRPr lang="en-US"/>
           </a:p>
@@ -6026,7 +6119,7 @@
           <a:p>
             <a:fld id="{A533CBE2-D5BE-47AC-ADC2-9CDFC1D0CF90}" type="datetime1">
               <a:rPr lang="en-US" smtClean="0"/>
-              <a:t>12/19/2022</a:t>
+              <a:t>12/25/2022</a:t>
             </a:fld>
             <a:endParaRPr lang="en-US"/>
           </a:p>
@@ -6327,7 +6420,7 @@
           <a:p>
             <a:fld id="{39B7EDB1-CE74-4951-85A2-0B01C2128E28}" type="datetime1">
               <a:rPr lang="en-US" smtClean="0"/>
-              <a:t>12/19/2022</a:t>
+              <a:t>12/25/2022</a:t>
             </a:fld>
             <a:endParaRPr lang="en-US"/>
           </a:p>
@@ -6775,7 +6868,7 @@
           <a:p>
             <a:fld id="{2BC7EB92-A5C2-4807-A9DC-9EDE6CBFB241}" type="datetime1">
               <a:rPr lang="en-US" smtClean="0"/>
-              <a:t>12/19/2022</a:t>
+              <a:t>12/25/2022</a:t>
             </a:fld>
             <a:endParaRPr lang="en-US"/>
           </a:p>
@@ -6921,7 +7014,7 @@
           <a:p>
             <a:fld id="{109E55A0-C911-4F03-82FC-7E5926047D46}" type="datetime1">
               <a:rPr lang="en-US" smtClean="0"/>
-              <a:t>12/19/2022</a:t>
+              <a:t>12/25/2022</a:t>
             </a:fld>
             <a:endParaRPr lang="en-US"/>
           </a:p>
@@ -7070,7 +7163,7 @@
           <a:p>
             <a:fld id="{2B7B7EE0-7771-4CD5-9B2B-3550753A54A1}" type="datetime1">
               <a:rPr lang="en-US" smtClean="0"/>
-              <a:t>12/19/2022</a:t>
+              <a:t>12/25/2022</a:t>
             </a:fld>
             <a:endParaRPr lang="en-US"/>
           </a:p>
@@ -7381,7 +7474,7 @@
           <a:p>
             <a:fld id="{F8B318B3-0E87-4416-A9B8-D891968C2727}" type="datetime1">
               <a:rPr lang="en-US" smtClean="0"/>
-              <a:t>12/19/2022</a:t>
+              <a:t>12/25/2022</a:t>
             </a:fld>
             <a:endParaRPr lang="en-US"/>
           </a:p>
@@ -7669,7 +7762,7 @@
           <a:p>
             <a:fld id="{EA476A42-A091-4468-A075-64A31BE59948}" type="datetime1">
               <a:rPr lang="en-US" smtClean="0"/>
-              <a:t>12/19/2022</a:t>
+              <a:t>12/25/2022</a:t>
             </a:fld>
             <a:endParaRPr lang="en-US"/>
           </a:p>
@@ -7910,7 +8003,7 @@
           <a:p>
             <a:fld id="{54D997E8-DDEE-43F1-8D9B-F8A1E11DE488}" type="datetime1">
               <a:rPr lang="en-US" smtClean="0"/>
-              <a:t>12/19/2022</a:t>
+              <a:t>12/25/2022</a:t>
             </a:fld>
             <a:endParaRPr lang="en-US"/>
           </a:p>
@@ -9486,17 +9579,12 @@
             </a:r>
             <a:r>
               <a:rPr lang="en-US" dirty="0" err="1"/>
-              <a:t>covey.town</a:t>
-            </a:r>
-            <a:r>
-              <a:rPr lang="en-US" dirty="0"/>
-              <a:t> as the running codebase for </a:t>
-            </a:r>
-            <a:r>
-              <a:rPr lang="en-US"/>
-              <a:t>the course</a:t>
-            </a:r>
-            <a:endParaRPr lang="en-US" dirty="0"/>
+              <a:t>Covey.Town</a:t>
+            </a:r>
+            <a:r>
+              <a:rPr lang="en-US" dirty="0"/>
+              <a:t> as the running codebase for the course</a:t>
+            </a:r>
           </a:p>
         </p:txBody>
       </p:sp>
@@ -11845,22 +11933,13 @@
             <a:pPr lvl="1"/>
             <a:r>
               <a:rPr lang="en-US" dirty="0"/>
-              <a:t>Share the Survey Link with Students.</a:t>
-            </a:r>
-          </a:p>
-          <a:p>
-            <a:pPr lvl="1"/>
-            <a:r>
-              <a:rPr lang="en-US" dirty="0"/>
-              <a:t>Allow them to complete the survey</a:t>
-            </a:r>
-          </a:p>
-          <a:p>
-            <a:pPr lvl="1"/>
-            <a:r>
-              <a:rPr lang="en-US" dirty="0"/>
-              <a:t>Discuss survey responses and answer questions.</a:t>
-            </a:r>
+              <a:t>Discuss survey responses and </a:t>
+            </a:r>
+            <a:r>
+              <a:rPr lang="en-US"/>
+              <a:t>answer questions</a:t>
+            </a:r>
+            <a:endParaRPr lang="en-US" dirty="0"/>
           </a:p>
         </p:txBody>
       </p:sp>
@@ -11973,7 +12052,7 @@
           <a:p>
             <a:r>
               <a:rPr lang="en-US" dirty="0"/>
-              <a:t>We have around 398 students and 22 teaching assistants.</a:t>
+              <a:t>We have around 400 students and 22 teaching assistants.</a:t>
             </a:r>
           </a:p>
           <a:p>

</xml_diff>